<commit_message>
Adds RSC reference to rmarkdown cheatsheet
</commit_message>
<xml_diff>
--- a/powerpoints/rmarkdown-2.0.pptx
+++ b/powerpoints/rmarkdown-2.0.pptx
@@ -815,8 +815,8 @@
         </p:nvSpPr>
         <p:spPr>
           <a:xfrm>
-            <a:off x="0" y="158750"/>
-            <a:ext cx="13964218" cy="10477500"/>
+            <a:off x="-873125" y="158750"/>
+            <a:ext cx="15708068" cy="10477500"/>
           </a:xfrm>
           <a:prstGeom prst="rect">
             <a:avLst/>
@@ -939,7 +939,7 @@
         <p:spPr>
           <a:xfrm>
             <a:off x="1725786" y="840878"/>
-            <a:ext cx="10504786" cy="6357443"/>
+            <a:ext cx="10504786" cy="7006839"/>
           </a:xfrm>
           <a:prstGeom prst="rect">
             <a:avLst/>
@@ -1214,13 +1214,13 @@
           <p:cNvPr id="38" name="Image"/>
           <p:cNvSpPr/>
           <p:nvPr>
-            <p:ph type="pic" sz="half" idx="13"/>
+            <p:ph type="pic" idx="13"/>
           </p:nvPr>
         </p:nvSpPr>
         <p:spPr>
           <a:xfrm>
-            <a:off x="7216923" y="840878"/>
-            <a:ext cx="5729884" cy="8840392"/>
+            <a:off x="2919511" y="840878"/>
+            <a:ext cx="13274230" cy="8849488"/>
           </a:xfrm>
           <a:prstGeom prst="rect">
             <a:avLst/>
@@ -1616,13 +1616,13 @@
           <p:cNvPr id="65" name="Image"/>
           <p:cNvSpPr/>
           <p:nvPr>
-            <p:ph type="pic" sz="half" idx="13"/>
+            <p:ph type="pic" idx="13"/>
           </p:nvPr>
         </p:nvSpPr>
         <p:spPr>
           <a:xfrm>
-            <a:off x="7216923" y="2955478"/>
-            <a:ext cx="5729884" cy="6753077"/>
+            <a:off x="4870400" y="2955478"/>
+            <a:ext cx="10129615" cy="6753077"/>
           </a:xfrm>
           <a:prstGeom prst="rect">
             <a:avLst/>
@@ -1883,13 +1883,13 @@
           <p:cNvPr id="83" name="Image"/>
           <p:cNvSpPr/>
           <p:nvPr>
-            <p:ph type="pic" sz="half" idx="13"/>
+            <p:ph type="pic" idx="13"/>
           </p:nvPr>
         </p:nvSpPr>
         <p:spPr>
           <a:xfrm>
-            <a:off x="1023193" y="1113730"/>
-            <a:ext cx="5729884" cy="8567540"/>
+            <a:off x="-2551163" y="1113730"/>
+            <a:ext cx="12864953" cy="8576636"/>
           </a:xfrm>
           <a:prstGeom prst="rect">
             <a:avLst/>
@@ -1915,8 +1915,8 @@
         </p:nvSpPr>
         <p:spPr>
           <a:xfrm>
-            <a:off x="7216923" y="5629423"/>
-            <a:ext cx="5729884" cy="4051847"/>
+            <a:off x="7175996" y="5558791"/>
+            <a:ext cx="6507511" cy="4340601"/>
           </a:xfrm>
           <a:prstGeom prst="rect">
             <a:avLst/>
@@ -1942,8 +1942,8 @@
         </p:nvSpPr>
         <p:spPr>
           <a:xfrm>
-            <a:off x="7223603" y="1113730"/>
-            <a:ext cx="5729884" cy="4051847"/>
+            <a:off x="6985000" y="1111310"/>
+            <a:ext cx="6302872" cy="4201915"/>
           </a:xfrm>
           <a:prstGeom prst="rect">
             <a:avLst/>
@@ -2196,9 +2196,6 @@
         <a:buNone/>
         <a:tabLst/>
         <a:defRPr b="0" baseline="0" cap="none" i="0" spc="0" strike="noStrike" sz="4800" u="none">
-          <a:ln>
-            <a:noFill/>
-          </a:ln>
           <a:solidFill>
             <a:srgbClr val="585858"/>
           </a:solidFill>
@@ -2225,9 +2222,6 @@
         <a:buNone/>
         <a:tabLst/>
         <a:defRPr b="0" baseline="0" cap="none" i="0" spc="0" strike="noStrike" sz="4800" u="none">
-          <a:ln>
-            <a:noFill/>
-          </a:ln>
           <a:solidFill>
             <a:srgbClr val="585858"/>
           </a:solidFill>
@@ -2254,9 +2248,6 @@
         <a:buNone/>
         <a:tabLst/>
         <a:defRPr b="0" baseline="0" cap="none" i="0" spc="0" strike="noStrike" sz="4800" u="none">
-          <a:ln>
-            <a:noFill/>
-          </a:ln>
           <a:solidFill>
             <a:srgbClr val="585858"/>
           </a:solidFill>
@@ -2283,9 +2274,6 @@
         <a:buNone/>
         <a:tabLst/>
         <a:defRPr b="0" baseline="0" cap="none" i="0" spc="0" strike="noStrike" sz="4800" u="none">
-          <a:ln>
-            <a:noFill/>
-          </a:ln>
           <a:solidFill>
             <a:srgbClr val="585858"/>
           </a:solidFill>
@@ -2312,9 +2300,6 @@
         <a:buNone/>
         <a:tabLst/>
         <a:defRPr b="0" baseline="0" cap="none" i="0" spc="0" strike="noStrike" sz="4800" u="none">
-          <a:ln>
-            <a:noFill/>
-          </a:ln>
           <a:solidFill>
             <a:srgbClr val="585858"/>
           </a:solidFill>
@@ -2341,9 +2326,6 @@
         <a:buNone/>
         <a:tabLst/>
         <a:defRPr b="0" baseline="0" cap="none" i="0" spc="0" strike="noStrike" sz="4800" u="none">
-          <a:ln>
-            <a:noFill/>
-          </a:ln>
           <a:solidFill>
             <a:srgbClr val="585858"/>
           </a:solidFill>
@@ -2370,9 +2352,6 @@
         <a:buNone/>
         <a:tabLst/>
         <a:defRPr b="0" baseline="0" cap="none" i="0" spc="0" strike="noStrike" sz="4800" u="none">
-          <a:ln>
-            <a:noFill/>
-          </a:ln>
           <a:solidFill>
             <a:srgbClr val="585858"/>
           </a:solidFill>
@@ -2399,9 +2378,6 @@
         <a:buNone/>
         <a:tabLst/>
         <a:defRPr b="0" baseline="0" cap="none" i="0" spc="0" strike="noStrike" sz="4800" u="none">
-          <a:ln>
-            <a:noFill/>
-          </a:ln>
           <a:solidFill>
             <a:srgbClr val="585858"/>
           </a:solidFill>
@@ -2428,9 +2404,6 @@
         <a:buNone/>
         <a:tabLst/>
         <a:defRPr b="0" baseline="0" cap="none" i="0" spc="0" strike="noStrike" sz="4800" u="none">
-          <a:ln>
-            <a:noFill/>
-          </a:ln>
           <a:solidFill>
             <a:srgbClr val="585858"/>
           </a:solidFill>
@@ -2459,9 +2432,6 @@
         <a:buChar char="•"/>
         <a:tabLst/>
         <a:defRPr b="0" baseline="0" cap="none" i="0" spc="0" strike="noStrike" sz="1200" u="none">
-          <a:ln>
-            <a:noFill/>
-          </a:ln>
           <a:solidFill>
             <a:srgbClr val="000000"/>
           </a:solidFill>
@@ -2488,9 +2458,6 @@
         <a:buChar char="•"/>
         <a:tabLst/>
         <a:defRPr b="0" baseline="0" cap="none" i="0" spc="0" strike="noStrike" sz="1200" u="none">
-          <a:ln>
-            <a:noFill/>
-          </a:ln>
           <a:solidFill>
             <a:srgbClr val="000000"/>
           </a:solidFill>
@@ -2517,9 +2484,6 @@
         <a:buChar char="•"/>
         <a:tabLst/>
         <a:defRPr b="0" baseline="0" cap="none" i="0" spc="0" strike="noStrike" sz="1200" u="none">
-          <a:ln>
-            <a:noFill/>
-          </a:ln>
           <a:solidFill>
             <a:srgbClr val="000000"/>
           </a:solidFill>
@@ -2546,9 +2510,6 @@
         <a:buChar char="•"/>
         <a:tabLst/>
         <a:defRPr b="0" baseline="0" cap="none" i="0" spc="0" strike="noStrike" sz="1200" u="none">
-          <a:ln>
-            <a:noFill/>
-          </a:ln>
           <a:solidFill>
             <a:srgbClr val="000000"/>
           </a:solidFill>
@@ -2575,9 +2536,6 @@
         <a:buChar char="•"/>
         <a:tabLst/>
         <a:defRPr b="0" baseline="0" cap="none" i="0" spc="0" strike="noStrike" sz="1200" u="none">
-          <a:ln>
-            <a:noFill/>
-          </a:ln>
           <a:solidFill>
             <a:srgbClr val="000000"/>
           </a:solidFill>
@@ -2604,9 +2562,6 @@
         <a:buChar char="•"/>
         <a:tabLst/>
         <a:defRPr b="0" baseline="0" cap="none" i="0" spc="0" strike="noStrike" sz="1200" u="none">
-          <a:ln>
-            <a:noFill/>
-          </a:ln>
           <a:solidFill>
             <a:srgbClr val="000000"/>
           </a:solidFill>
@@ -2633,9 +2588,6 @@
         <a:buChar char="•"/>
         <a:tabLst/>
         <a:defRPr b="0" baseline="0" cap="none" i="0" spc="0" strike="noStrike" sz="1200" u="none">
-          <a:ln>
-            <a:noFill/>
-          </a:ln>
           <a:solidFill>
             <a:srgbClr val="000000"/>
           </a:solidFill>
@@ -2662,9 +2614,6 @@
         <a:buChar char="•"/>
         <a:tabLst/>
         <a:defRPr b="0" baseline="0" cap="none" i="0" spc="0" strike="noStrike" sz="1200" u="none">
-          <a:ln>
-            <a:noFill/>
-          </a:ln>
           <a:solidFill>
             <a:srgbClr val="000000"/>
           </a:solidFill>
@@ -2691,9 +2640,6 @@
         <a:buChar char="•"/>
         <a:tabLst/>
         <a:defRPr b="0" baseline="0" cap="none" i="0" spc="0" strike="noStrike" sz="1200" u="none">
-          <a:ln>
-            <a:noFill/>
-          </a:ln>
           <a:solidFill>
             <a:srgbClr val="000000"/>
           </a:solidFill>
@@ -2722,9 +2668,6 @@
         <a:buNone/>
         <a:tabLst/>
         <a:defRPr b="0" baseline="0" cap="none" i="0" spc="0" strike="noStrike" sz="1800" u="none">
-          <a:ln>
-            <a:noFill/>
-          </a:ln>
           <a:solidFill>
             <a:schemeClr val="tx1"/>
           </a:solidFill>
@@ -2751,9 +2694,6 @@
         <a:buNone/>
         <a:tabLst/>
         <a:defRPr b="0" baseline="0" cap="none" i="0" spc="0" strike="noStrike" sz="1800" u="none">
-          <a:ln>
-            <a:noFill/>
-          </a:ln>
           <a:solidFill>
             <a:schemeClr val="tx1"/>
           </a:solidFill>
@@ -2780,9 +2720,6 @@
         <a:buNone/>
         <a:tabLst/>
         <a:defRPr b="0" baseline="0" cap="none" i="0" spc="0" strike="noStrike" sz="1800" u="none">
-          <a:ln>
-            <a:noFill/>
-          </a:ln>
           <a:solidFill>
             <a:schemeClr val="tx1"/>
           </a:solidFill>
@@ -2809,9 +2746,6 @@
         <a:buNone/>
         <a:tabLst/>
         <a:defRPr b="0" baseline="0" cap="none" i="0" spc="0" strike="noStrike" sz="1800" u="none">
-          <a:ln>
-            <a:noFill/>
-          </a:ln>
           <a:solidFill>
             <a:schemeClr val="tx1"/>
           </a:solidFill>
@@ -2838,9 +2772,6 @@
         <a:buNone/>
         <a:tabLst/>
         <a:defRPr b="0" baseline="0" cap="none" i="0" spc="0" strike="noStrike" sz="1800" u="none">
-          <a:ln>
-            <a:noFill/>
-          </a:ln>
           <a:solidFill>
             <a:schemeClr val="tx1"/>
           </a:solidFill>
@@ -2867,9 +2798,6 @@
         <a:buNone/>
         <a:tabLst/>
         <a:defRPr b="0" baseline="0" cap="none" i="0" spc="0" strike="noStrike" sz="1800" u="none">
-          <a:ln>
-            <a:noFill/>
-          </a:ln>
           <a:solidFill>
             <a:schemeClr val="tx1"/>
           </a:solidFill>
@@ -2896,9 +2824,6 @@
         <a:buNone/>
         <a:tabLst/>
         <a:defRPr b="0" baseline="0" cap="none" i="0" spc="0" strike="noStrike" sz="1800" u="none">
-          <a:ln>
-            <a:noFill/>
-          </a:ln>
           <a:solidFill>
             <a:schemeClr val="tx1"/>
           </a:solidFill>
@@ -2925,9 +2850,6 @@
         <a:buNone/>
         <a:tabLst/>
         <a:defRPr b="0" baseline="0" cap="none" i="0" spc="0" strike="noStrike" sz="1800" u="none">
-          <a:ln>
-            <a:noFill/>
-          </a:ln>
           <a:solidFill>
             <a:schemeClr val="tx1"/>
           </a:solidFill>
@@ -2954,9 +2876,6 @@
         <a:buNone/>
         <a:tabLst/>
         <a:defRPr b="0" baseline="0" cap="none" i="0" spc="0" strike="noStrike" sz="1800" u="none">
-          <a:ln>
-            <a:noFill/>
-          </a:ln>
           <a:solidFill>
             <a:schemeClr val="tx1"/>
           </a:solidFill>
@@ -2989,16 +2908,181 @@
           <a:chExt cx="0" cy="0"/>
         </a:xfrm>
       </p:grpSpPr>
+      <p:sp>
+        <p:nvSpPr>
+          <p:cNvPr id="119" name="Rectangle"/>
+          <p:cNvSpPr/>
+          <p:nvPr/>
+        </p:nvSpPr>
+        <p:spPr>
+          <a:xfrm>
+            <a:off x="10444243" y="9444098"/>
+            <a:ext cx="3265234" cy="916941"/>
+          </a:xfrm>
+          <a:prstGeom prst="rect">
+            <a:avLst/>
+          </a:prstGeom>
+          <a:gradFill>
+            <a:gsLst>
+              <a:gs pos="0">
+                <a:srgbClr val="FFFFFF">
+                  <a:alpha val="32629"/>
+                </a:srgbClr>
+              </a:gs>
+              <a:gs pos="100000">
+                <a:srgbClr val="FF7E79">
+                  <a:alpha val="32629"/>
+                </a:srgbClr>
+              </a:gs>
+            </a:gsLst>
+            <a:lin ang="16200000"/>
+          </a:gradFill>
+          <a:ln w="12700">
+            <a:miter lim="400000"/>
+          </a:ln>
+        </p:spPr>
+        <p:txBody>
+          <a:bodyPr lIns="54570" tIns="54570" rIns="54570" bIns="54570" anchor="ctr"/>
+          <a:lstStyle/>
+          <a:p>
+            <a:pPr>
+              <a:lnSpc>
+                <a:spcPct val="80000"/>
+              </a:lnSpc>
+              <a:spcBef>
+                <a:spcPts val="0"/>
+              </a:spcBef>
+              <a:defRPr b="0">
+                <a:solidFill>
+                  <a:srgbClr val="000000"/>
+                </a:solidFill>
+              </a:defRPr>
+            </a:pPr>
+          </a:p>
+        </p:txBody>
+      </p:sp>
+      <p:sp>
+        <p:nvSpPr>
+          <p:cNvPr id="120" name="Publish on  RStudio Connect, to share R Markdown documents securely, schedule automatic updates, and interact with parameters in real time. www.rstudio.com/products/connect/"/>
+          <p:cNvSpPr txBox="1"/>
+          <p:nvPr/>
+        </p:nvSpPr>
+        <p:spPr>
+          <a:xfrm>
+            <a:off x="10547481" y="9495069"/>
+            <a:ext cx="3131718" cy="723901"/>
+          </a:xfrm>
+          <a:prstGeom prst="rect">
+            <a:avLst/>
+          </a:prstGeom>
+          <a:ln w="12700">
+            <a:miter lim="400000"/>
+          </a:ln>
+          <a:extLst>
+            <a:ext uri="{C572A759-6A51-4108-AA02-DFA0A04FC94B}">
+              <ma14:wrappingTextBoxFlag xmlns:ma14="http://schemas.microsoft.com/office/mac/drawingml/2011/main" val="1"/>
+            </a:ext>
+          </a:extLst>
+        </p:spPr>
+        <p:txBody>
+          <a:bodyPr lIns="0" tIns="0" rIns="0" bIns="0" anchor="ctr">
+            <a:spAutoFit/>
+          </a:bodyPr>
+          <a:lstStyle/>
+          <a:p>
+            <a:pPr>
+              <a:spcBef>
+                <a:spcPts val="0"/>
+              </a:spcBef>
+              <a:buClr>
+                <a:srgbClr val="000000"/>
+              </a:buClr>
+              <a:defRPr b="0">
+                <a:solidFill>
+                  <a:srgbClr val="000000"/>
+                </a:solidFill>
+              </a:defRPr>
+            </a:pPr>
+            <a:r>
+              <a:rPr b="1">
+                <a:solidFill>
+                  <a:srgbClr val="C85349"/>
+                </a:solidFill>
+              </a:rPr>
+              <a:t>Publish on  RStudio Connect</a:t>
+            </a:r>
+            <a:r>
+              <a:rPr sz="1100">
+                <a:solidFill>
+                  <a:srgbClr val="C85349"/>
+                </a:solidFill>
+              </a:rPr>
+              <a:t>,</a:t>
+            </a:r>
+            <a:r>
+              <a:rPr sz="1100"/>
+              <a:t> to share R Markdown documents securely, schedule automatic updates, and interact with parameters in real time. </a:t>
+            </a:r>
+            <a:r>
+              <a:rPr sz="1100" u="sng">
+                <a:hlinkClick r:id="rId2" invalidUrl="" action="" tgtFrame="" tooltip="" history="1" highlightClick="0" endSnd="0"/>
+              </a:rPr>
+              <a:t>www.rstudio.com/products/connect/</a:t>
+            </a:r>
+          </a:p>
+        </p:txBody>
+      </p:sp>
+      <p:sp>
+        <p:nvSpPr>
+          <p:cNvPr id="121" name="Line"/>
+          <p:cNvSpPr/>
+          <p:nvPr/>
+        </p:nvSpPr>
+        <p:spPr>
+          <a:xfrm>
+            <a:off x="363682" y="1102908"/>
+            <a:ext cx="8179568" cy="1"/>
+          </a:xfrm>
+          <a:prstGeom prst="line">
+            <a:avLst/>
+          </a:prstGeom>
+          <a:ln w="3175">
+            <a:solidFill>
+              <a:srgbClr val="767C85"/>
+            </a:solidFill>
+            <a:miter lim="400000"/>
+          </a:ln>
+        </p:spPr>
+        <p:txBody>
+          <a:bodyPr lIns="54570" tIns="54570" rIns="54570" bIns="54570" anchor="ctr"/>
+          <a:lstStyle/>
+          <a:p>
+            <a:pPr>
+              <a:lnSpc>
+                <a:spcPct val="80000"/>
+              </a:lnSpc>
+              <a:spcBef>
+                <a:spcPts val="600"/>
+              </a:spcBef>
+              <a:defRPr b="0">
+                <a:solidFill>
+                  <a:srgbClr val="000000"/>
+                </a:solidFill>
+              </a:defRPr>
+            </a:pPr>
+          </a:p>
+        </p:txBody>
+      </p:sp>
       <p:pic>
         <p:nvPicPr>
-          <p:cNvPr id="119" name="Screen Shot 2015-12-28 at 12.05.41 PM.png" descr="Screen Shot 2015-12-28 at 12.05.41 PM.png"/>
+          <p:cNvPr id="122" name="Screen Shot 2015-12-28 at 12.05.41 PM.png" descr="Screen Shot 2015-12-28 at 12.05.41 PM.png"/>
           <p:cNvPicPr>
             <a:picLocks noChangeAspect="1"/>
           </p:cNvPicPr>
           <p:nvPr/>
         </p:nvPicPr>
         <p:blipFill>
-          <a:blip r:embed="rId2">
+          <a:blip r:embed="rId3">
             <a:extLst/>
           </a:blip>
           <a:stretch>
@@ -3027,14 +3111,14 @@
       </p:pic>
       <p:pic>
         <p:nvPicPr>
-          <p:cNvPr id="120" name="Screen Shot 2016-02-26 at 3.47.41 PM.png" descr="Screen Shot 2016-02-26 at 3.47.41 PM.png"/>
+          <p:cNvPr id="123" name="Screen Shot 2016-02-26 at 3.47.41 PM.png" descr="Screen Shot 2016-02-26 at 3.47.41 PM.png"/>
           <p:cNvPicPr>
             <a:picLocks noChangeAspect="1"/>
           </p:cNvPicPr>
           <p:nvPr/>
         </p:nvPicPr>
         <p:blipFill>
-          <a:blip r:embed="rId3">
+          <a:blip r:embed="rId4">
             <a:extLst/>
           </a:blip>
           <a:stretch>
@@ -3056,7 +3140,7 @@
       </p:pic>
       <p:sp>
         <p:nvSpPr>
-          <p:cNvPr id="121" name="Group"/>
+          <p:cNvPr id="124" name="Group"/>
           <p:cNvSpPr txBox="1"/>
           <p:nvPr/>
         </p:nvSpPr>
@@ -3130,7 +3214,7 @@
       </p:sp>
       <p:grpSp>
         <p:nvGrpSpPr>
-          <p:cNvPr id="139" name="Group"/>
+          <p:cNvPr id="142" name="Group"/>
           <p:cNvGrpSpPr/>
           <p:nvPr/>
         </p:nvGrpSpPr>
@@ -3144,7 +3228,7 @@
         </p:grpSpPr>
         <p:grpSp>
           <p:nvGrpSpPr>
-            <p:cNvPr id="137" name="Group"/>
+            <p:cNvPr id="140" name="Group"/>
             <p:cNvGrpSpPr/>
             <p:nvPr/>
           </p:nvGrpSpPr>
@@ -3158,7 +3242,7 @@
           </p:grpSpPr>
           <p:sp>
             <p:nvSpPr>
-              <p:cNvPr id="122" name="Triangle"/>
+              <p:cNvPr id="125" name="Triangle"/>
               <p:cNvSpPr/>
               <p:nvPr/>
             </p:nvSpPr>
@@ -3206,7 +3290,7 @@
           </p:sp>
           <p:sp>
             <p:nvSpPr>
-              <p:cNvPr id="123" name="Circle"/>
+              <p:cNvPr id="126" name="Circle"/>
               <p:cNvSpPr/>
               <p:nvPr/>
             </p:nvSpPr>
@@ -3251,7 +3335,7 @@
           </p:sp>
           <p:sp>
             <p:nvSpPr>
-              <p:cNvPr id="124" name="Circle"/>
+              <p:cNvPr id="127" name="Circle"/>
               <p:cNvSpPr/>
               <p:nvPr/>
             </p:nvSpPr>
@@ -3298,7 +3382,7 @@
           </p:sp>
           <p:sp>
             <p:nvSpPr>
-              <p:cNvPr id="125" name="Triangle"/>
+              <p:cNvPr id="128" name="Triangle"/>
               <p:cNvSpPr/>
               <p:nvPr/>
             </p:nvSpPr>
@@ -3346,7 +3430,7 @@
           </p:sp>
           <p:sp>
             <p:nvSpPr>
-              <p:cNvPr id="126" name="Triangle"/>
+              <p:cNvPr id="129" name="Triangle"/>
               <p:cNvSpPr/>
               <p:nvPr/>
             </p:nvSpPr>
@@ -3394,7 +3478,7 @@
           </p:sp>
           <p:sp>
             <p:nvSpPr>
-              <p:cNvPr id="127" name="Circle"/>
+              <p:cNvPr id="130" name="Circle"/>
               <p:cNvSpPr/>
               <p:nvPr/>
             </p:nvSpPr>
@@ -3439,7 +3523,7 @@
           </p:sp>
           <p:sp>
             <p:nvSpPr>
-              <p:cNvPr id="128" name="Circle"/>
+              <p:cNvPr id="131" name="Circle"/>
               <p:cNvSpPr/>
               <p:nvPr/>
             </p:nvSpPr>
@@ -3484,7 +3568,7 @@
           </p:sp>
           <p:sp>
             <p:nvSpPr>
-              <p:cNvPr id="129" name="Triangle"/>
+              <p:cNvPr id="132" name="Triangle"/>
               <p:cNvSpPr/>
               <p:nvPr/>
             </p:nvSpPr>
@@ -3532,7 +3616,7 @@
           </p:sp>
           <p:sp>
             <p:nvSpPr>
-              <p:cNvPr id="130" name="Circle"/>
+              <p:cNvPr id="133" name="Circle"/>
               <p:cNvSpPr/>
               <p:nvPr/>
             </p:nvSpPr>
@@ -3577,7 +3661,7 @@
           </p:sp>
           <p:sp>
             <p:nvSpPr>
-              <p:cNvPr id="131" name="Triangle"/>
+              <p:cNvPr id="134" name="Triangle"/>
               <p:cNvSpPr/>
               <p:nvPr/>
             </p:nvSpPr>
@@ -3625,7 +3709,7 @@
           </p:sp>
           <p:sp>
             <p:nvSpPr>
-              <p:cNvPr id="132" name="Circle"/>
+              <p:cNvPr id="135" name="Circle"/>
               <p:cNvSpPr/>
               <p:nvPr/>
             </p:nvSpPr>
@@ -3670,7 +3754,7 @@
           </p:sp>
           <p:sp>
             <p:nvSpPr>
-              <p:cNvPr id="133" name="Triangle"/>
+              <p:cNvPr id="136" name="Triangle"/>
               <p:cNvSpPr/>
               <p:nvPr/>
             </p:nvSpPr>
@@ -3718,7 +3802,7 @@
           </p:sp>
           <p:sp>
             <p:nvSpPr>
-              <p:cNvPr id="134" name="Circle"/>
+              <p:cNvPr id="137" name="Circle"/>
               <p:cNvSpPr/>
               <p:nvPr/>
             </p:nvSpPr>
@@ -3763,7 +3847,7 @@
           </p:sp>
           <p:sp>
             <p:nvSpPr>
-              <p:cNvPr id="135" name="Triangle"/>
+              <p:cNvPr id="138" name="Triangle"/>
               <p:cNvSpPr/>
               <p:nvPr/>
             </p:nvSpPr>
@@ -3811,7 +3895,7 @@
           </p:sp>
           <p:sp>
             <p:nvSpPr>
-              <p:cNvPr id="136" name="Circle"/>
+              <p:cNvPr id="139" name="Circle"/>
               <p:cNvSpPr/>
               <p:nvPr/>
             </p:nvSpPr>
@@ -3857,7 +3941,7 @@
         </p:grpSp>
         <p:sp>
           <p:nvSpPr>
-            <p:cNvPr id="138" name="Rectangle"/>
+            <p:cNvPr id="141" name="Rectangle"/>
             <p:cNvSpPr/>
             <p:nvPr/>
           </p:nvSpPr>
@@ -3925,14 +4009,14 @@
       </p:grpSp>
       <p:pic>
         <p:nvPicPr>
-          <p:cNvPr id="140" name="Screen Shot 2016-02-26 at 3.38.51 PM.png" descr="Screen Shot 2016-02-26 at 3.38.51 PM.png"/>
+          <p:cNvPr id="143" name="Screen Shot 2016-02-26 at 3.38.51 PM.png" descr="Screen Shot 2016-02-26 at 3.38.51 PM.png"/>
           <p:cNvPicPr>
             <a:picLocks noChangeAspect="1"/>
           </p:cNvPicPr>
           <p:nvPr/>
         </p:nvPicPr>
         <p:blipFill>
-          <a:blip r:embed="rId4">
+          <a:blip r:embed="rId5">
             <a:extLst/>
           </a:blip>
           <a:srcRect l="9980" t="5056" r="9980" b="12139"/>
@@ -3962,7 +4046,7 @@
       </p:pic>
       <p:sp>
         <p:nvSpPr>
-          <p:cNvPr id="141" name="YAML Header  Optional section of render (e.g. pandoc)…"/>
+          <p:cNvPr id="144" name="YAML Header  Optional section of render (e.g. pandoc)…"/>
           <p:cNvSpPr txBox="1"/>
           <p:nvPr/>
         </p:nvSpPr>
@@ -4200,14 +4284,14 @@
       </p:sp>
       <p:sp>
         <p:nvSpPr>
-          <p:cNvPr id="142" name="Line"/>
+          <p:cNvPr id="145" name="Line"/>
           <p:cNvSpPr/>
           <p:nvPr/>
         </p:nvSpPr>
         <p:spPr>
-          <a:xfrm flipV="1">
+          <a:xfrm>
             <a:off x="10382209" y="5867883"/>
-            <a:ext cx="1835192" cy="12701"/>
+            <a:ext cx="3333792" cy="1"/>
           </a:xfrm>
           <a:prstGeom prst="line">
             <a:avLst/>
@@ -4241,14 +4325,14 @@
       </p:sp>
       <p:sp>
         <p:nvSpPr>
-          <p:cNvPr id="143" name="Interactive Documents"/>
+          <p:cNvPr id="146" name="Interactive Documents"/>
           <p:cNvSpPr txBox="1"/>
           <p:nvPr/>
         </p:nvSpPr>
         <p:spPr>
           <a:xfrm>
-            <a:off x="10466209" y="5867400"/>
-            <a:ext cx="1554481" cy="675641"/>
+            <a:off x="10466209" y="5867399"/>
+            <a:ext cx="3221302" cy="431801"/>
           </a:xfrm>
           <a:prstGeom prst="rect">
             <a:avLst/>
@@ -4263,7 +4347,7 @@
           </a:extLst>
         </p:spPr>
         <p:txBody>
-          <a:bodyPr wrap="none" lIns="12700" tIns="12700" rIns="12700" bIns="12700">
+          <a:bodyPr lIns="12700" tIns="12700" rIns="12700" bIns="12700">
             <a:spAutoFit/>
           </a:bodyPr>
           <a:lstStyle/>
@@ -4282,25 +4366,21 @@
               </a:defRPr>
             </a:pPr>
             <a:r>
-              <a:t>Interactive</a:t>
-            </a:r>
-            <a:br/>
-            <a:r>
-              <a:t>Documents</a:t>
+              <a:t>Interactive Documents</a:t>
             </a:r>
           </a:p>
         </p:txBody>
       </p:sp>
       <p:sp>
         <p:nvSpPr>
-          <p:cNvPr id="144" name="Turn your report into an interactive Shiny  document in 4 steps…"/>
+          <p:cNvPr id="147" name="Turn your report into an interactive Shiny document in 4 steps…"/>
           <p:cNvSpPr txBox="1"/>
           <p:nvPr/>
         </p:nvSpPr>
         <p:spPr>
           <a:xfrm>
-            <a:off x="10466209" y="6554781"/>
-            <a:ext cx="2911553" cy="1013461"/>
+            <a:off x="10466209" y="6338881"/>
+            <a:ext cx="3182632" cy="789941"/>
           </a:xfrm>
           <a:prstGeom prst="rect">
             <a:avLst/>
@@ -4341,11 +4421,7 @@
               </a:defRPr>
             </a:pPr>
             <a:r>
-              <a:t>Turn your report into an interactive Shiny </a:t>
-            </a:r>
-            <a:br/>
-            <a:r>
-              <a:t>document in 4 steps</a:t>
+              <a:t>Turn your report into an interactive Shiny document in 4 steps</a:t>
             </a:r>
           </a:p>
           <a:p>
@@ -4417,20 +4493,20 @@
               </a:defRPr>
             </a:pPr>
             <a:r>
-              <a:t>4. Render with rmarkdown::run  or click Run Document in RStudio IDE</a:t>
+              <a:t>4. Render w rmarkdown::run  or click Run Document in RStudio IDE</a:t>
             </a:r>
           </a:p>
         </p:txBody>
       </p:sp>
       <p:sp>
         <p:nvSpPr>
-          <p:cNvPr id="145" name="---…"/>
+          <p:cNvPr id="148" name="---…"/>
           <p:cNvSpPr/>
           <p:nvPr/>
         </p:nvSpPr>
         <p:spPr>
           <a:xfrm>
-            <a:off x="10470972" y="7716296"/>
+            <a:off x="10470972" y="7246396"/>
             <a:ext cx="1400082" cy="1782463"/>
           </a:xfrm>
           <a:prstGeom prst="rect">
@@ -4686,13 +4762,13 @@
       </p:sp>
       <p:sp>
         <p:nvSpPr>
-          <p:cNvPr id="146" name="Arrow"/>
+          <p:cNvPr id="149" name="Arrow"/>
           <p:cNvSpPr/>
           <p:nvPr/>
         </p:nvSpPr>
         <p:spPr>
           <a:xfrm>
-            <a:off x="11953227" y="8493692"/>
+            <a:off x="11953227" y="8023792"/>
             <a:ext cx="195895" cy="214946"/>
           </a:xfrm>
           <a:prstGeom prst="rightArrow">
@@ -4730,14 +4806,14 @@
       </p:sp>
       <p:sp>
         <p:nvSpPr>
-          <p:cNvPr id="147" name="Embed a complete app into your document with shiny::shinyAppDir()…"/>
+          <p:cNvPr id="150" name="Embed a complete app into your document with shiny::shinyAppDir()"/>
           <p:cNvSpPr txBox="1"/>
           <p:nvPr/>
         </p:nvSpPr>
         <p:spPr>
           <a:xfrm>
-            <a:off x="10466209" y="9581429"/>
-            <a:ext cx="2911553" cy="637541"/>
+            <a:off x="10466209" y="9111529"/>
+            <a:ext cx="3182632" cy="251461"/>
           </a:xfrm>
           <a:prstGeom prst="rect">
             <a:avLst/>
@@ -4784,91 +4860,12 @@
               <a:rPr b="1"/>
               <a:t>shinyAppDir()</a:t>
             </a:r>
-            <a:endParaRPr b="1"/>
-          </a:p>
-          <a:p>
-            <a:pPr>
-              <a:lnSpc>
-                <a:spcPct val="80000"/>
-              </a:lnSpc>
-              <a:spcBef>
-                <a:spcPts val="400"/>
-              </a:spcBef>
-              <a:buClr>
-                <a:schemeClr val="accent4">
-                  <a:hueOff val="384618"/>
-                  <a:satOff val="3869"/>
-                  <a:lumOff val="5802"/>
-                </a:schemeClr>
-              </a:buClr>
-              <a:defRPr b="0" sz="900">
-                <a:solidFill>
-                  <a:srgbClr val="000000"/>
-                </a:solidFill>
-              </a:defRPr>
-            </a:pPr>
-            <a:r>
-              <a:t>NOTE: </a:t>
-            </a:r>
-            <a:r>
-              <a:rPr i="1"/>
-              <a:t>Your report will rendered as a Shiny app, which means you must choose an html output format, like </a:t>
-            </a:r>
-            <a:r>
-              <a:rPr b="1" i="1"/>
-              <a:t>html_document</a:t>
-            </a:r>
-            <a:r>
-              <a:rPr i="1"/>
-              <a:t>, and serve it with an active R Session.</a:t>
-            </a:r>
           </a:p>
         </p:txBody>
       </p:sp>
       <p:sp>
         <p:nvSpPr>
-          <p:cNvPr id="148" name="Line"/>
-          <p:cNvSpPr/>
-          <p:nvPr/>
-        </p:nvSpPr>
-        <p:spPr>
-          <a:xfrm>
-            <a:off x="363682" y="1102908"/>
-            <a:ext cx="8179568" cy="1"/>
-          </a:xfrm>
-          <a:prstGeom prst="line">
-            <a:avLst/>
-          </a:prstGeom>
-          <a:ln w="3175">
-            <a:solidFill>
-              <a:srgbClr val="767C85"/>
-            </a:solidFill>
-            <a:miter lim="400000"/>
-          </a:ln>
-        </p:spPr>
-        <p:txBody>
-          <a:bodyPr lIns="54570" tIns="54570" rIns="54570" bIns="54570" anchor="ctr"/>
-          <a:lstStyle/>
-          <a:p>
-            <a:pPr>
-              <a:lnSpc>
-                <a:spcPct val="80000"/>
-              </a:lnSpc>
-              <a:spcBef>
-                <a:spcPts val="600"/>
-              </a:spcBef>
-              <a:defRPr b="0">
-                <a:solidFill>
-                  <a:srgbClr val="000000"/>
-                </a:solidFill>
-              </a:defRPr>
-            </a:pPr>
-          </a:p>
-        </p:txBody>
-      </p:sp>
-      <p:sp>
-        <p:nvSpPr>
-          <p:cNvPr id="149" name="RStudio® is a trademark of RStudio, Inc.  •  CC BY SA  RStudio •  info@rstudio.com  •  844-448-1212 • rstudio.com •  Learn more at rmarkdown.rstudio.com  •  rmarkdown  1.6  •  Updated: 2016-02"/>
+          <p:cNvPr id="151" name="RStudio® is a trademark of RStudio, Inc.  •  CC BY SA  RStudio •  info@rstudio.com  •  844-448-1212 • rstudio.com •  Learn more at rmarkdown.rstudio.com  •  rmarkdown  1.6  •  Updated: 2016-02"/>
           <p:cNvSpPr txBox="1"/>
           <p:nvPr/>
         </p:nvSpPr>
@@ -4913,7 +4910,7 @@
             </a:r>
             <a:r>
               <a:rPr>
-                <a:hlinkClick r:id="rId5" invalidUrl="" action="" tgtFrame="" tooltip="" history="1" highlightClick="0" endSnd="0"/>
+                <a:hlinkClick r:id="rId6" invalidUrl="" action="" tgtFrame="" tooltip="" history="1" highlightClick="0" endSnd="0"/>
               </a:rPr>
               <a:t>CC BY SA</a:t>
             </a:r>
@@ -4922,7 +4919,7 @@
             </a:r>
             <a:r>
               <a:rPr>
-                <a:hlinkClick r:id="rId6" invalidUrl="" action="" tgtFrame="" tooltip="" history="1" highlightClick="0" endSnd="0"/>
+                <a:hlinkClick r:id="rId7" invalidUrl="" action="" tgtFrame="" tooltip="" history="1" highlightClick="0" endSnd="0"/>
               </a:rPr>
               <a:t>info@rstudio.com</a:t>
             </a:r>
@@ -4931,7 +4928,7 @@
             </a:r>
             <a:r>
               <a:rPr>
-                <a:hlinkClick r:id="rId7" invalidUrl="" action="" tgtFrame="" tooltip="" history="1" highlightClick="0" endSnd="0"/>
+                <a:hlinkClick r:id="rId8" invalidUrl="" action="" tgtFrame="" tooltip="" history="1" highlightClick="0" endSnd="0"/>
               </a:rPr>
               <a:t>rstudio.com</a:t>
             </a:r>
@@ -4950,7 +4947,7 @@
       </p:sp>
       <p:sp>
         <p:nvSpPr>
-          <p:cNvPr id="150" name="Line"/>
+          <p:cNvPr id="152" name="Line"/>
           <p:cNvSpPr/>
           <p:nvPr/>
         </p:nvSpPr>
@@ -4991,7 +4988,7 @@
       </p:sp>
       <p:sp>
         <p:nvSpPr>
-          <p:cNvPr id="151" name="R Markdown : : CHEAT SHEET"/>
+          <p:cNvPr id="153" name="R Markdown : : CHEAT SHEET"/>
           <p:cNvSpPr txBox="1"/>
           <p:nvPr>
             <p:ph type="title"/>
@@ -5031,7 +5028,7 @@
       </p:sp>
       <p:sp>
         <p:nvSpPr>
-          <p:cNvPr id="152" name="Open a new .Rmd file at File ▶︎ New File ▶︎  R Markdown. Use the wizard that opens  to pre-populate the file with a template…"/>
+          <p:cNvPr id="154" name="Open a new .Rmd file at File ▶︎ New File ▶︎  R Markdown. Use the wizard that opens  to pre-populate the file with a template…"/>
           <p:cNvSpPr txBox="1"/>
           <p:nvPr/>
         </p:nvSpPr>
@@ -5224,7 +5221,7 @@
       </p:sp>
       <p:sp>
         <p:nvSpPr>
-          <p:cNvPr id="153" name="Circle"/>
+          <p:cNvPr id="155" name="Circle"/>
           <p:cNvSpPr/>
           <p:nvPr/>
         </p:nvSpPr>
@@ -5237,7 +5234,7 @@
             <a:avLst/>
           </a:prstGeom>
           <a:blipFill>
-            <a:blip r:embed="rId8"/>
+            <a:blip r:embed="rId9"/>
           </a:blipFill>
           <a:ln w="12700">
             <a:miter lim="400000"/>
@@ -5265,7 +5262,7 @@
       </p:sp>
       <p:sp>
         <p:nvSpPr>
-          <p:cNvPr id="154" name="1"/>
+          <p:cNvPr id="156" name="1"/>
           <p:cNvSpPr txBox="1"/>
           <p:nvPr/>
         </p:nvSpPr>
@@ -5313,7 +5310,7 @@
       </p:sp>
       <p:sp>
         <p:nvSpPr>
-          <p:cNvPr id="155" name="Circle"/>
+          <p:cNvPr id="157" name="Circle"/>
           <p:cNvSpPr/>
           <p:nvPr/>
         </p:nvSpPr>
@@ -5326,7 +5323,7 @@
             <a:avLst/>
           </a:prstGeom>
           <a:blipFill>
-            <a:blip r:embed="rId9"/>
+            <a:blip r:embed="rId10"/>
           </a:blipFill>
           <a:ln w="12700">
             <a:miter lim="400000"/>
@@ -5354,7 +5351,7 @@
       </p:sp>
       <p:sp>
         <p:nvSpPr>
-          <p:cNvPr id="156" name="2"/>
+          <p:cNvPr id="158" name="2"/>
           <p:cNvSpPr txBox="1"/>
           <p:nvPr/>
         </p:nvSpPr>
@@ -5402,7 +5399,7 @@
       </p:sp>
       <p:sp>
         <p:nvSpPr>
-          <p:cNvPr id="157" name="Circle"/>
+          <p:cNvPr id="159" name="Circle"/>
           <p:cNvSpPr/>
           <p:nvPr/>
         </p:nvSpPr>
@@ -5415,7 +5412,7 @@
             <a:avLst/>
           </a:prstGeom>
           <a:blipFill>
-            <a:blip r:embed="rId10"/>
+            <a:blip r:embed="rId11"/>
           </a:blipFill>
           <a:ln w="12700">
             <a:miter lim="400000"/>
@@ -5443,7 +5440,7 @@
       </p:sp>
       <p:sp>
         <p:nvSpPr>
-          <p:cNvPr id="158" name="3"/>
+          <p:cNvPr id="160" name="3"/>
           <p:cNvSpPr txBox="1"/>
           <p:nvPr/>
         </p:nvSpPr>
@@ -5491,7 +5488,7 @@
       </p:sp>
       <p:sp>
         <p:nvSpPr>
-          <p:cNvPr id="159" name="Circle"/>
+          <p:cNvPr id="161" name="Circle"/>
           <p:cNvSpPr/>
           <p:nvPr/>
         </p:nvSpPr>
@@ -5504,7 +5501,7 @@
             <a:avLst/>
           </a:prstGeom>
           <a:blipFill>
-            <a:blip r:embed="rId11"/>
+            <a:blip r:embed="rId12"/>
           </a:blipFill>
           <a:ln w="12700">
             <a:miter lim="400000"/>
@@ -5532,7 +5529,7 @@
       </p:sp>
       <p:sp>
         <p:nvSpPr>
-          <p:cNvPr id="160" name="4"/>
+          <p:cNvPr id="162" name="4"/>
           <p:cNvSpPr txBox="1"/>
           <p:nvPr/>
         </p:nvSpPr>
@@ -5580,7 +5577,7 @@
       </p:sp>
       <p:sp>
         <p:nvSpPr>
-          <p:cNvPr id="161" name="Circle"/>
+          <p:cNvPr id="163" name="Circle"/>
           <p:cNvSpPr/>
           <p:nvPr/>
         </p:nvSpPr>
@@ -5593,7 +5590,7 @@
             <a:avLst/>
           </a:prstGeom>
           <a:blipFill>
-            <a:blip r:embed="rId12"/>
+            <a:blip r:embed="rId13"/>
           </a:blipFill>
           <a:ln w="12700">
             <a:miter lim="400000"/>
@@ -5621,7 +5618,7 @@
       </p:sp>
       <p:sp>
         <p:nvSpPr>
-          <p:cNvPr id="162" name="5"/>
+          <p:cNvPr id="164" name="5"/>
           <p:cNvSpPr txBox="1"/>
           <p:nvPr/>
         </p:nvSpPr>
@@ -5669,7 +5666,7 @@
       </p:sp>
       <p:sp>
         <p:nvSpPr>
-          <p:cNvPr id="163" name="Circle"/>
+          <p:cNvPr id="165" name="Circle"/>
           <p:cNvSpPr/>
           <p:nvPr/>
         </p:nvSpPr>
@@ -5682,7 +5679,7 @@
             <a:avLst/>
           </a:prstGeom>
           <a:blipFill>
-            <a:blip r:embed="rId13"/>
+            <a:blip r:embed="rId14"/>
           </a:blipFill>
           <a:ln w="12700">
             <a:miter lim="400000"/>
@@ -5710,7 +5707,7 @@
       </p:sp>
       <p:sp>
         <p:nvSpPr>
-          <p:cNvPr id="164" name="6"/>
+          <p:cNvPr id="166" name="6"/>
           <p:cNvSpPr txBox="1"/>
           <p:nvPr/>
         </p:nvSpPr>
@@ -5758,7 +5755,7 @@
       </p:sp>
       <p:sp>
         <p:nvSpPr>
-          <p:cNvPr id="165" name="Circle"/>
+          <p:cNvPr id="167" name="Circle"/>
           <p:cNvSpPr/>
           <p:nvPr/>
         </p:nvSpPr>
@@ -5771,7 +5768,7 @@
             <a:avLst/>
           </a:prstGeom>
           <a:blipFill>
-            <a:blip r:embed="rId14"/>
+            <a:blip r:embed="rId15"/>
           </a:blipFill>
           <a:ln w="12700">
             <a:miter lim="400000"/>
@@ -5799,7 +5796,7 @@
       </p:sp>
       <p:sp>
         <p:nvSpPr>
-          <p:cNvPr id="166" name="7"/>
+          <p:cNvPr id="168" name="7"/>
           <p:cNvSpPr txBox="1"/>
           <p:nvPr/>
         </p:nvSpPr>
@@ -5847,14 +5844,14 @@
       </p:sp>
       <p:pic>
         <p:nvPicPr>
-          <p:cNvPr id="167" name="Screen Shot 2014-07-28 at 5.02.25 PM.png" descr="Screen Shot 2014-07-28 at 5.02.25 PM.png"/>
+          <p:cNvPr id="169" name="Screen Shot 2014-07-28 at 5.02.25 PM.png" descr="Screen Shot 2014-07-28 at 5.02.25 PM.png"/>
           <p:cNvPicPr>
             <a:picLocks noChangeAspect="1"/>
           </p:cNvPicPr>
           <p:nvPr/>
         </p:nvPicPr>
         <p:blipFill>
-          <a:blip r:embed="rId15">
+          <a:blip r:embed="rId16">
             <a:extLst/>
           </a:blip>
           <a:stretch>
@@ -5876,7 +5873,7 @@
       </p:pic>
       <p:sp>
         <p:nvSpPr>
-          <p:cNvPr id="168" name="modify chunk options"/>
+          <p:cNvPr id="170" name="modify chunk options"/>
           <p:cNvSpPr txBox="1"/>
           <p:nvPr/>
         </p:nvSpPr>
@@ -5933,7 +5930,7 @@
       </p:sp>
       <p:sp>
         <p:nvSpPr>
-          <p:cNvPr id="169" name="run all previous chunks"/>
+          <p:cNvPr id="171" name="run all previous chunks"/>
           <p:cNvSpPr txBox="1"/>
           <p:nvPr/>
         </p:nvSpPr>
@@ -5990,7 +5987,7 @@
       </p:sp>
       <p:sp>
         <p:nvSpPr>
-          <p:cNvPr id="170" name="run current chunk"/>
+          <p:cNvPr id="172" name="run current chunk"/>
           <p:cNvSpPr txBox="1"/>
           <p:nvPr/>
         </p:nvSpPr>
@@ -6047,7 +6044,7 @@
       </p:sp>
       <p:sp>
         <p:nvSpPr>
-          <p:cNvPr id="171" name="Line"/>
+          <p:cNvPr id="173" name="Line"/>
           <p:cNvSpPr/>
           <p:nvPr/>
         </p:nvSpPr>
@@ -6091,7 +6088,7 @@
       </p:sp>
       <p:sp>
         <p:nvSpPr>
-          <p:cNvPr id="172" name="Line"/>
+          <p:cNvPr id="174" name="Line"/>
           <p:cNvSpPr/>
           <p:nvPr/>
         </p:nvSpPr>
@@ -6135,7 +6132,7 @@
       </p:sp>
       <p:sp>
         <p:nvSpPr>
-          <p:cNvPr id="173" name="Line"/>
+          <p:cNvPr id="175" name="Line"/>
           <p:cNvSpPr/>
           <p:nvPr/>
         </p:nvSpPr>
@@ -6179,7 +6176,7 @@
       </p:sp>
       <p:sp>
         <p:nvSpPr>
-          <p:cNvPr id="174" name="insert code chunk"/>
+          <p:cNvPr id="176" name="insert code chunk"/>
           <p:cNvSpPr txBox="1"/>
           <p:nvPr/>
         </p:nvSpPr>
@@ -6236,7 +6233,7 @@
       </p:sp>
       <p:sp>
         <p:nvSpPr>
-          <p:cNvPr id="175" name="go to code chunk"/>
+          <p:cNvPr id="177" name="go to code chunk"/>
           <p:cNvSpPr txBox="1"/>
           <p:nvPr/>
         </p:nvSpPr>
@@ -6293,7 +6290,7 @@
       </p:sp>
       <p:sp>
         <p:nvSpPr>
-          <p:cNvPr id="176" name="run code chunk(s)"/>
+          <p:cNvPr id="178" name="run code chunk(s)"/>
           <p:cNvSpPr txBox="1"/>
           <p:nvPr/>
         </p:nvSpPr>
@@ -6350,7 +6347,7 @@
       </p:sp>
       <p:sp>
         <p:nvSpPr>
-          <p:cNvPr id="177" name="Line"/>
+          <p:cNvPr id="179" name="Line"/>
           <p:cNvSpPr/>
           <p:nvPr/>
         </p:nvSpPr>
@@ -6394,7 +6391,7 @@
       </p:sp>
       <p:sp>
         <p:nvSpPr>
-          <p:cNvPr id="178" name="Line"/>
+          <p:cNvPr id="180" name="Line"/>
           <p:cNvSpPr/>
           <p:nvPr/>
         </p:nvSpPr>
@@ -6438,7 +6435,7 @@
       </p:sp>
       <p:sp>
         <p:nvSpPr>
-          <p:cNvPr id="179" name="Line"/>
+          <p:cNvPr id="181" name="Line"/>
           <p:cNvSpPr/>
           <p:nvPr/>
         </p:nvSpPr>
@@ -6482,7 +6479,7 @@
       </p:sp>
       <p:sp>
         <p:nvSpPr>
-          <p:cNvPr id="180" name="Line"/>
+          <p:cNvPr id="182" name="Line"/>
           <p:cNvSpPr/>
           <p:nvPr/>
         </p:nvSpPr>
@@ -6526,7 +6523,7 @@
       </p:sp>
       <p:sp>
         <p:nvSpPr>
-          <p:cNvPr id="181" name="Circle"/>
+          <p:cNvPr id="183" name="Circle"/>
           <p:cNvSpPr/>
           <p:nvPr/>
         </p:nvSpPr>
@@ -6539,7 +6536,7 @@
             <a:avLst/>
           </a:prstGeom>
           <a:blipFill>
-            <a:blip r:embed="rId16"/>
+            <a:blip r:embed="rId17"/>
           </a:blipFill>
           <a:ln w="12700">
             <a:miter lim="400000"/>
@@ -6567,7 +6564,7 @@
       </p:sp>
       <p:sp>
         <p:nvSpPr>
-          <p:cNvPr id="182" name="1"/>
+          <p:cNvPr id="184" name="1"/>
           <p:cNvSpPr txBox="1"/>
           <p:nvPr/>
         </p:nvSpPr>
@@ -6615,7 +6612,7 @@
       </p:sp>
       <p:sp>
         <p:nvSpPr>
-          <p:cNvPr id="183" name="Circle"/>
+          <p:cNvPr id="185" name="Circle"/>
           <p:cNvSpPr/>
           <p:nvPr/>
         </p:nvSpPr>
@@ -6628,7 +6625,7 @@
             <a:avLst/>
           </a:prstGeom>
           <a:blipFill>
-            <a:blip r:embed="rId17"/>
+            <a:blip r:embed="rId18"/>
           </a:blipFill>
           <a:ln w="12700">
             <a:miter lim="400000"/>
@@ -6656,7 +6653,7 @@
       </p:sp>
       <p:sp>
         <p:nvSpPr>
-          <p:cNvPr id="184" name="2"/>
+          <p:cNvPr id="186" name="2"/>
           <p:cNvSpPr txBox="1"/>
           <p:nvPr/>
         </p:nvSpPr>
@@ -6704,7 +6701,7 @@
       </p:sp>
       <p:sp>
         <p:nvSpPr>
-          <p:cNvPr id="185" name="Circle"/>
+          <p:cNvPr id="187" name="Circle"/>
           <p:cNvSpPr/>
           <p:nvPr/>
         </p:nvSpPr>
@@ -6717,7 +6714,7 @@
             <a:avLst/>
           </a:prstGeom>
           <a:blipFill>
-            <a:blip r:embed="rId18"/>
+            <a:blip r:embed="rId19"/>
           </a:blipFill>
           <a:ln w="12700">
             <a:miter lim="400000"/>
@@ -6745,7 +6742,7 @@
       </p:sp>
       <p:sp>
         <p:nvSpPr>
-          <p:cNvPr id="186" name="3"/>
+          <p:cNvPr id="188" name="3"/>
           <p:cNvSpPr txBox="1"/>
           <p:nvPr/>
         </p:nvSpPr>
@@ -6793,7 +6790,7 @@
       </p:sp>
       <p:sp>
         <p:nvSpPr>
-          <p:cNvPr id="187" name="Circle"/>
+          <p:cNvPr id="189" name="Circle"/>
           <p:cNvSpPr/>
           <p:nvPr/>
         </p:nvSpPr>
@@ -6806,7 +6803,7 @@
             <a:avLst/>
           </a:prstGeom>
           <a:blipFill>
-            <a:blip r:embed="rId19"/>
+            <a:blip r:embed="rId20"/>
           </a:blipFill>
           <a:ln w="12700">
             <a:miter lim="400000"/>
@@ -6834,7 +6831,7 @@
       </p:sp>
       <p:sp>
         <p:nvSpPr>
-          <p:cNvPr id="188" name="4"/>
+          <p:cNvPr id="190" name="4"/>
           <p:cNvSpPr txBox="1"/>
           <p:nvPr/>
         </p:nvSpPr>
@@ -6882,7 +6879,7 @@
       </p:sp>
       <p:sp>
         <p:nvSpPr>
-          <p:cNvPr id="189" name="Circle"/>
+          <p:cNvPr id="191" name="Circle"/>
           <p:cNvSpPr/>
           <p:nvPr/>
         </p:nvSpPr>
@@ -6895,7 +6892,7 @@
             <a:avLst/>
           </a:prstGeom>
           <a:blipFill>
-            <a:blip r:embed="rId20"/>
+            <a:blip r:embed="rId21"/>
           </a:blipFill>
           <a:ln w="12700">
             <a:miter lim="400000"/>
@@ -6923,7 +6920,7 @@
       </p:sp>
       <p:sp>
         <p:nvSpPr>
-          <p:cNvPr id="190" name="5"/>
+          <p:cNvPr id="192" name="5"/>
           <p:cNvSpPr txBox="1"/>
           <p:nvPr/>
         </p:nvSpPr>
@@ -6971,7 +6968,7 @@
       </p:sp>
       <p:sp>
         <p:nvSpPr>
-          <p:cNvPr id="191" name="Circle"/>
+          <p:cNvPr id="193" name="Circle"/>
           <p:cNvSpPr/>
           <p:nvPr/>
         </p:nvSpPr>
@@ -6984,7 +6981,7 @@
             <a:avLst/>
           </a:prstGeom>
           <a:blipFill>
-            <a:blip r:embed="rId21"/>
+            <a:blip r:embed="rId22"/>
           </a:blipFill>
           <a:ln w="12700">
             <a:miter lim="400000"/>
@@ -7012,7 +7009,7 @@
       </p:sp>
       <p:sp>
         <p:nvSpPr>
-          <p:cNvPr id="192" name="6"/>
+          <p:cNvPr id="194" name="6"/>
           <p:cNvSpPr txBox="1"/>
           <p:nvPr/>
         </p:nvSpPr>
@@ -7060,7 +7057,7 @@
       </p:sp>
       <p:sp>
         <p:nvSpPr>
-          <p:cNvPr id="193" name="Circle"/>
+          <p:cNvPr id="195" name="Circle"/>
           <p:cNvSpPr/>
           <p:nvPr/>
         </p:nvSpPr>
@@ -7073,7 +7070,7 @@
             <a:avLst/>
           </a:prstGeom>
           <a:blipFill>
-            <a:blip r:embed="rId22"/>
+            <a:blip r:embed="rId23"/>
           </a:blipFill>
           <a:ln w="12700">
             <a:miter lim="400000"/>
@@ -7101,7 +7098,7 @@
       </p:sp>
       <p:sp>
         <p:nvSpPr>
-          <p:cNvPr id="194" name="7"/>
+          <p:cNvPr id="196" name="7"/>
           <p:cNvSpPr txBox="1"/>
           <p:nvPr/>
         </p:nvSpPr>
@@ -7149,7 +7146,7 @@
       </p:sp>
       <p:sp>
         <p:nvSpPr>
-          <p:cNvPr id="195" name="Line"/>
+          <p:cNvPr id="197" name="Line"/>
           <p:cNvSpPr/>
           <p:nvPr/>
         </p:nvSpPr>
@@ -7193,7 +7190,7 @@
       </p:sp>
       <p:sp>
         <p:nvSpPr>
-          <p:cNvPr id="196" name="publish"/>
+          <p:cNvPr id="198" name="publish"/>
           <p:cNvSpPr txBox="1"/>
           <p:nvPr/>
         </p:nvSpPr>
@@ -7250,7 +7247,7 @@
       </p:sp>
       <p:sp>
         <p:nvSpPr>
-          <p:cNvPr id="197" name="show outline"/>
+          <p:cNvPr id="199" name="show outline"/>
           <p:cNvSpPr txBox="1"/>
           <p:nvPr/>
         </p:nvSpPr>
@@ -7307,7 +7304,7 @@
       </p:sp>
       <p:sp>
         <p:nvSpPr>
-          <p:cNvPr id="198" name="Line"/>
+          <p:cNvPr id="200" name="Line"/>
           <p:cNvSpPr/>
           <p:nvPr/>
         </p:nvSpPr>
@@ -7351,7 +7348,7 @@
       </p:sp>
       <p:sp>
         <p:nvSpPr>
-          <p:cNvPr id="199" name="synch publish button to accounts at…"/>
+          <p:cNvPr id="201" name="synch publish button to accounts at…"/>
           <p:cNvSpPr txBox="1"/>
           <p:nvPr/>
         </p:nvSpPr>
@@ -7425,7 +7422,7 @@
             </a:pPr>
             <a:r>
               <a:rPr u="sng">
-                <a:hlinkClick r:id="rId23" invalidUrl="" action="" tgtFrame="" tooltip="" history="1" highlightClick="0" endSnd="0"/>
+                <a:hlinkClick r:id="rId24" invalidUrl="" action="" tgtFrame="" tooltip="" history="1" highlightClick="0" endSnd="0"/>
               </a:rPr>
               <a:t>rpubs.com</a:t>
             </a:r>
@@ -7456,7 +7453,7 @@
             </a:pPr>
             <a:r>
               <a:rPr u="sng">
-                <a:hlinkClick r:id="rId24" invalidUrl="" action="" tgtFrame="" tooltip="" history="1" highlightClick="0" endSnd="0"/>
+                <a:hlinkClick r:id="rId25" invalidUrl="" action="" tgtFrame="" tooltip="" history="1" highlightClick="0" endSnd="0"/>
               </a:rPr>
               <a:t>shinyapps.io</a:t>
             </a:r>
@@ -7497,7 +7494,7 @@
       </p:sp>
       <p:sp>
         <p:nvSpPr>
-          <p:cNvPr id="200" name="Reload document"/>
+          <p:cNvPr id="202" name="Reload document"/>
           <p:cNvSpPr txBox="1"/>
           <p:nvPr/>
         </p:nvSpPr>
@@ -7554,7 +7551,7 @@
       </p:sp>
       <p:sp>
         <p:nvSpPr>
-          <p:cNvPr id="201" name="Find in document"/>
+          <p:cNvPr id="203" name="Find in document"/>
           <p:cNvSpPr txBox="1"/>
           <p:nvPr/>
         </p:nvSpPr>
@@ -7611,7 +7608,7 @@
       </p:sp>
       <p:sp>
         <p:nvSpPr>
-          <p:cNvPr id="202" name="File path to output document"/>
+          <p:cNvPr id="204" name="File path to output document"/>
           <p:cNvSpPr txBox="1"/>
           <p:nvPr/>
         </p:nvSpPr>
@@ -7668,7 +7665,7 @@
       </p:sp>
       <p:sp>
         <p:nvSpPr>
-          <p:cNvPr id="203" name="Line"/>
+          <p:cNvPr id="205" name="Line"/>
           <p:cNvSpPr/>
           <p:nvPr/>
         </p:nvSpPr>
@@ -7712,7 +7709,7 @@
       </p:sp>
       <p:sp>
         <p:nvSpPr>
-          <p:cNvPr id="204" name="Line"/>
+          <p:cNvPr id="206" name="Line"/>
           <p:cNvSpPr/>
           <p:nvPr/>
         </p:nvSpPr>
@@ -7756,7 +7753,7 @@
       </p:sp>
       <p:sp>
         <p:nvSpPr>
-          <p:cNvPr id="205" name="Line"/>
+          <p:cNvPr id="207" name="Line"/>
           <p:cNvSpPr/>
           <p:nvPr/>
         </p:nvSpPr>
@@ -7800,7 +7797,7 @@
       </p:sp>
       <p:sp>
         <p:nvSpPr>
-          <p:cNvPr id="206" name="Line"/>
+          <p:cNvPr id="208" name="Line"/>
           <p:cNvSpPr/>
           <p:nvPr/>
         </p:nvSpPr>
@@ -7844,7 +7841,7 @@
       </p:sp>
       <p:sp>
         <p:nvSpPr>
-          <p:cNvPr id="207" name="set preview location"/>
+          <p:cNvPr id="209" name="set preview location"/>
           <p:cNvSpPr txBox="1"/>
           <p:nvPr/>
         </p:nvSpPr>
@@ -7901,7 +7898,7 @@
       </p:sp>
       <p:sp>
         <p:nvSpPr>
-          <p:cNvPr id="208" name="Line"/>
+          <p:cNvPr id="210" name="Line"/>
           <p:cNvSpPr/>
           <p:nvPr/>
         </p:nvSpPr>
@@ -7945,7 +7942,7 @@
       </p:sp>
       <p:sp>
         <p:nvSpPr>
-          <p:cNvPr id="209" name="What is R Markdown?"/>
+          <p:cNvPr id="211" name="What is R Markdown?"/>
           <p:cNvSpPr txBox="1"/>
           <p:nvPr/>
         </p:nvSpPr>
@@ -7993,7 +7990,7 @@
       </p:sp>
       <p:sp>
         <p:nvSpPr>
-          <p:cNvPr id="210" name="Insert with `r &lt;code&gt;`. Results appear as text without code."/>
+          <p:cNvPr id="212" name="Insert with `r &lt;code&gt;`. Results appear as text without code."/>
           <p:cNvSpPr txBox="1"/>
           <p:nvPr/>
         </p:nvSpPr>
@@ -8055,7 +8052,7 @@
       </p:sp>
       <p:sp>
         <p:nvSpPr>
-          <p:cNvPr id="211" name="Options not listed above: R.options, aniopts, autodep, background, cache.comments, cache.lazy, cache.rebuild, cache.vars, dev, dev.args, dpi, engine.opts, engine.path, fig.asp, fig.env, fig.ext, fig.keep, fig.lp, fig.path, fig.pos, fig.process, fig.retina, fig.scap, fig.show, fig.showtext, fig.subcap, interval, out.extra, out.height, out.width, prompt, purl, ref.label, render, size, split, tidy.opts"/>
+          <p:cNvPr id="213" name="Options not listed above: R.options, aniopts, autodep, background, cache.comments, cache.lazy, cache.rebuild, cache.vars, dev, dev.args, dpi, engine.opts, engine.path, fig.asp, fig.env, fig.ext, fig.keep, fig.lp, fig.path, fig.pos, fig.process, fig.retina, fig.scap, fig.show, fig.showtext, fig.subcap, interval, out.extra, out.height, out.width, prompt, purl, ref.label, render, size, split, tidy.opts"/>
           <p:cNvSpPr txBox="1"/>
           <p:nvPr/>
         </p:nvSpPr>
@@ -8110,7 +8107,7 @@
       </p:sp>
       <p:sp>
         <p:nvSpPr>
-          <p:cNvPr id="212" name="Embed code with knitr syntax"/>
+          <p:cNvPr id="214" name="Embed code with knitr syntax"/>
           <p:cNvSpPr txBox="1"/>
           <p:nvPr/>
         </p:nvSpPr>
@@ -8158,7 +8155,7 @@
       </p:sp>
       <p:sp>
         <p:nvSpPr>
-          <p:cNvPr id="213" name="Arrow"/>
+          <p:cNvPr id="215" name="Arrow"/>
           <p:cNvSpPr/>
           <p:nvPr/>
         </p:nvSpPr>
@@ -8202,7 +8199,7 @@
       </p:sp>
       <p:sp>
         <p:nvSpPr>
-          <p:cNvPr id="214" name="Built with `r getRversion()`                Built with 3.2.3"/>
+          <p:cNvPr id="216" name="Built with `r getRversion()`                Built with 3.2.3"/>
           <p:cNvSpPr txBox="1"/>
           <p:nvPr/>
         </p:nvSpPr>
@@ -8252,7 +8249,7 @@
       </p:sp>
       <p:sp>
         <p:nvSpPr>
-          <p:cNvPr id="215" name="INLINE CODE"/>
+          <p:cNvPr id="217" name="INLINE CODE"/>
           <p:cNvSpPr txBox="1"/>
           <p:nvPr/>
         </p:nvSpPr>
@@ -8296,7 +8293,7 @@
       </p:sp>
       <p:sp>
         <p:nvSpPr>
-          <p:cNvPr id="216" name="CODE CHUNKS"/>
+          <p:cNvPr id="218" name="CODE CHUNKS"/>
           <p:cNvSpPr txBox="1"/>
           <p:nvPr/>
         </p:nvSpPr>
@@ -8340,7 +8337,7 @@
       </p:sp>
       <p:sp>
         <p:nvSpPr>
-          <p:cNvPr id="217" name="Arrow"/>
+          <p:cNvPr id="219" name="Arrow"/>
           <p:cNvSpPr/>
           <p:nvPr/>
         </p:nvSpPr>
@@ -8384,7 +8381,7 @@
       </p:sp>
       <p:sp>
         <p:nvSpPr>
-          <p:cNvPr id="218" name="```{r echo=TRUE}…"/>
+          <p:cNvPr id="220" name="```{r echo=TRUE}…"/>
           <p:cNvSpPr txBox="1"/>
           <p:nvPr/>
         </p:nvSpPr>
@@ -8468,7 +8465,7 @@
       </p:sp>
       <p:sp>
         <p:nvSpPr>
-          <p:cNvPr id="219" name="Set with knitr::opts_chunk$set(), e.g."/>
+          <p:cNvPr id="221" name="Set with knitr::opts_chunk$set(), e.g."/>
           <p:cNvSpPr txBox="1"/>
           <p:nvPr/>
         </p:nvSpPr>
@@ -8528,7 +8525,7 @@
       </p:sp>
       <p:sp>
         <p:nvSpPr>
-          <p:cNvPr id="220" name="GLOBAL OPTIONS"/>
+          <p:cNvPr id="222" name="GLOBAL OPTIONS"/>
           <p:cNvSpPr txBox="1"/>
           <p:nvPr/>
         </p:nvSpPr>
@@ -8572,7 +8569,7 @@
       </p:sp>
       <p:sp>
         <p:nvSpPr>
-          <p:cNvPr id="221" name="```{r include=FALSE}…"/>
+          <p:cNvPr id="223" name="```{r include=FALSE}…"/>
           <p:cNvSpPr txBox="1"/>
           <p:nvPr/>
         </p:nvSpPr>
@@ -8656,7 +8653,7 @@
       </p:sp>
       <p:sp>
         <p:nvSpPr>
-          <p:cNvPr id="222" name="Use rmarkdown::render() to render/knit at cmd line. Important args:"/>
+          <p:cNvPr id="224" name="Use rmarkdown::render() to render/knit at cmd line. Important args:"/>
           <p:cNvSpPr txBox="1"/>
           <p:nvPr/>
         </p:nvSpPr>
@@ -8716,7 +8713,7 @@
       </p:sp>
       <p:sp>
         <p:nvSpPr>
-          <p:cNvPr id="223" name="Workflow"/>
+          <p:cNvPr id="225" name="Workflow"/>
           <p:cNvSpPr txBox="1"/>
           <p:nvPr/>
         </p:nvSpPr>
@@ -8764,7 +8761,7 @@
       </p:sp>
       <p:sp>
         <p:nvSpPr>
-          <p:cNvPr id="224" name="input - file to render…"/>
+          <p:cNvPr id="226" name="input - file to render…"/>
           <p:cNvSpPr txBox="1"/>
           <p:nvPr/>
         </p:nvSpPr>
@@ -8832,7 +8829,7 @@
       </p:sp>
       <p:sp>
         <p:nvSpPr>
-          <p:cNvPr id="225" name="render"/>
+          <p:cNvPr id="227" name="render"/>
           <p:cNvSpPr txBox="1"/>
           <p:nvPr/>
         </p:nvSpPr>
@@ -8880,7 +8877,7 @@
       </p:sp>
       <p:sp>
         <p:nvSpPr>
-          <p:cNvPr id="226" name="Parameters"/>
+          <p:cNvPr id="228" name="Parameters"/>
           <p:cNvSpPr txBox="1"/>
           <p:nvPr/>
         </p:nvSpPr>
@@ -8928,14 +8925,14 @@
       </p:sp>
       <p:sp>
         <p:nvSpPr>
-          <p:cNvPr id="227" name="Parameterize your documents to reuse with different inputs (e.g., data, values, etc.)"/>
+          <p:cNvPr id="229" name="Parameterize your documents to reuse with new inputs (e.g., data, values, etc.)"/>
           <p:cNvSpPr txBox="1"/>
           <p:nvPr/>
         </p:nvSpPr>
         <p:spPr>
           <a:xfrm>
             <a:off x="10466209" y="3922136"/>
-            <a:ext cx="2120879" cy="251461"/>
+            <a:ext cx="2068138" cy="251461"/>
           </a:xfrm>
           <a:prstGeom prst="rect">
             <a:avLst/>
@@ -8978,20 +8975,20 @@
           <a:p>
             <a:pPr/>
             <a:r>
-              <a:t>Parameterize your documents to reuse with different inputs (e.g., data, values, etc.)</a:t>
+              <a:t>Parameterize your documents to reuse with new inputs (e.g., data, values, etc.)</a:t>
             </a:r>
           </a:p>
         </p:txBody>
       </p:sp>
       <p:sp>
         <p:nvSpPr>
-          <p:cNvPr id="228" name="---…"/>
+          <p:cNvPr id="230" name="---…"/>
           <p:cNvSpPr/>
           <p:nvPr/>
         </p:nvSpPr>
         <p:spPr>
           <a:xfrm>
-            <a:off x="12360444" y="4100557"/>
+            <a:off x="12360444" y="3694157"/>
             <a:ext cx="1254805" cy="705452"/>
           </a:xfrm>
           <a:prstGeom prst="rect">
@@ -9109,13 +9106,13 @@
       </p:sp>
       <p:sp>
         <p:nvSpPr>
-          <p:cNvPr id="229" name="Today’s date…"/>
+          <p:cNvPr id="231" name="Today’s date…"/>
           <p:cNvSpPr/>
           <p:nvPr/>
         </p:nvSpPr>
         <p:spPr>
           <a:xfrm>
-            <a:off x="12360444" y="4865144"/>
+            <a:off x="12360444" y="4458744"/>
             <a:ext cx="1254805" cy="367305"/>
           </a:xfrm>
           <a:prstGeom prst="rect">
@@ -9179,7 +9176,7 @@
       </p:sp>
       <p:sp>
         <p:nvSpPr>
-          <p:cNvPr id="230" name="1. Add parameters · Create and set parameters in the header as sub-values of params…"/>
+          <p:cNvPr id="232" name="1. Add parameters · Create and set parameters in the header as sub-values of params…"/>
           <p:cNvSpPr txBox="1"/>
           <p:nvPr/>
         </p:nvSpPr>
@@ -9374,7 +9371,7 @@
       </p:sp>
       <p:sp>
         <p:nvSpPr>
-          <p:cNvPr id="231" name="output_options -  List of render  options (as in YAML)"/>
+          <p:cNvPr id="233" name="output_options -  List of render  options (as in YAML)"/>
           <p:cNvSpPr txBox="1"/>
           <p:nvPr/>
         </p:nvSpPr>
@@ -9432,7 +9429,7 @@
       </p:sp>
       <p:sp>
         <p:nvSpPr>
-          <p:cNvPr id="232" name="output_file…"/>
+          <p:cNvPr id="234" name="output_file…"/>
           <p:cNvSpPr txBox="1"/>
           <p:nvPr/>
         </p:nvSpPr>
@@ -9496,7 +9493,7 @@
       </p:sp>
       <p:sp>
         <p:nvSpPr>
-          <p:cNvPr id="233" name="params - list of params to use"/>
+          <p:cNvPr id="235" name="params - list of params to use"/>
           <p:cNvSpPr txBox="1"/>
           <p:nvPr/>
         </p:nvSpPr>
@@ -9546,7 +9543,7 @@
       </p:sp>
       <p:sp>
         <p:nvSpPr>
-          <p:cNvPr id="234" name="envir - environment  to evaluate code chunks in"/>
+          <p:cNvPr id="236" name="envir - environment  to evaluate code chunks in"/>
           <p:cNvSpPr txBox="1"/>
           <p:nvPr/>
         </p:nvSpPr>
@@ -9603,7 +9600,7 @@
       </p:sp>
       <p:sp>
         <p:nvSpPr>
-          <p:cNvPr id="235" name="encoding - of input file"/>
+          <p:cNvPr id="237" name="encoding - of input file"/>
           <p:cNvSpPr txBox="1"/>
           <p:nvPr/>
         </p:nvSpPr>
@@ -9653,7 +9650,7 @@
       </p:sp>
       <p:sp>
         <p:nvSpPr>
-          <p:cNvPr id="236" name="Line"/>
+          <p:cNvPr id="238" name="Line"/>
           <p:cNvSpPr/>
           <p:nvPr/>
         </p:nvSpPr>
@@ -9695,7 +9692,7 @@
       </p:sp>
       <p:sp>
         <p:nvSpPr>
-          <p:cNvPr id="237" name="Line"/>
+          <p:cNvPr id="239" name="Line"/>
           <p:cNvSpPr/>
           <p:nvPr/>
         </p:nvSpPr>
@@ -9737,7 +9734,7 @@
       </p:sp>
       <p:sp>
         <p:nvSpPr>
-          <p:cNvPr id="238" name="Line"/>
+          <p:cNvPr id="240" name="Line"/>
           <p:cNvSpPr/>
           <p:nvPr/>
         </p:nvSpPr>
@@ -9779,7 +9776,7 @@
       </p:sp>
       <p:sp>
         <p:nvSpPr>
-          <p:cNvPr id="239" name="Line"/>
+          <p:cNvPr id="241" name="Line"/>
           <p:cNvSpPr/>
           <p:nvPr/>
         </p:nvSpPr>
@@ -9821,7 +9818,7 @@
       </p:sp>
       <p:sp>
         <p:nvSpPr>
-          <p:cNvPr id="240" name="Line"/>
+          <p:cNvPr id="242" name="Line"/>
           <p:cNvSpPr/>
           <p:nvPr/>
         </p:nvSpPr>
@@ -9863,7 +9860,7 @@
       </p:sp>
       <p:sp>
         <p:nvSpPr>
-          <p:cNvPr id="241" name="Line"/>
+          <p:cNvPr id="243" name="Line"/>
           <p:cNvSpPr/>
           <p:nvPr/>
         </p:nvSpPr>
@@ -9905,7 +9902,7 @@
       </p:sp>
       <p:sp>
         <p:nvSpPr>
-          <p:cNvPr id="242" name="Line"/>
+          <p:cNvPr id="244" name="Line"/>
           <p:cNvSpPr/>
           <p:nvPr/>
         </p:nvSpPr>
@@ -9946,7 +9943,7 @@
       </p:sp>
       <p:sp>
         <p:nvSpPr>
-          <p:cNvPr id="243" name="Line"/>
+          <p:cNvPr id="245" name="Line"/>
           <p:cNvSpPr/>
           <p:nvPr/>
         </p:nvSpPr>
@@ -9987,7 +9984,7 @@
       </p:sp>
       <p:sp>
         <p:nvSpPr>
-          <p:cNvPr id="244" name="Line"/>
+          <p:cNvPr id="246" name="Line"/>
           <p:cNvSpPr/>
           <p:nvPr/>
         </p:nvSpPr>
@@ -10028,7 +10025,7 @@
       </p:sp>
       <p:sp>
         <p:nvSpPr>
-          <p:cNvPr id="245" name="Line"/>
+          <p:cNvPr id="247" name="Line"/>
           <p:cNvSpPr/>
           <p:nvPr/>
         </p:nvSpPr>
@@ -10069,7 +10066,7 @@
       </p:sp>
       <p:sp>
         <p:nvSpPr>
-          <p:cNvPr id="246" name=".rmd Structure"/>
+          <p:cNvPr id="248" name=".rmd Structure"/>
           <p:cNvSpPr txBox="1"/>
           <p:nvPr/>
         </p:nvSpPr>
@@ -10117,7 +10114,7 @@
       </p:sp>
       <p:sp>
         <p:nvSpPr>
-          <p:cNvPr id="247" name="Line"/>
+          <p:cNvPr id="249" name="Line"/>
           <p:cNvSpPr/>
           <p:nvPr/>
         </p:nvSpPr>
@@ -10158,7 +10155,7 @@
       </p:sp>
       <p:sp>
         <p:nvSpPr>
-          <p:cNvPr id="248" name=".Rmd files · An R Markdown…"/>
+          <p:cNvPr id="250" name=".Rmd files · An R Markdown…"/>
           <p:cNvSpPr txBox="1"/>
           <p:nvPr/>
         </p:nvSpPr>
@@ -10325,7 +10322,7 @@
       </p:sp>
       <p:sp>
         <p:nvSpPr>
-          <p:cNvPr id="249" name="cache - cache results for future knits (default = FALSE)…"/>
+          <p:cNvPr id="251" name="cache - cache results for future knits (default = FALSE)…"/>
           <p:cNvSpPr txBox="1"/>
           <p:nvPr/>
         </p:nvSpPr>
@@ -10463,7 +10460,7 @@
       </p:sp>
       <p:sp>
         <p:nvSpPr>
-          <p:cNvPr id="250" name="dependson - chunk dependencies for caching (default = NULL)…"/>
+          <p:cNvPr id="252" name="dependson - chunk dependencies for caching (default = NULL)…"/>
           <p:cNvSpPr txBox="1"/>
           <p:nvPr/>
         </p:nvSpPr>
@@ -10601,7 +10598,7 @@
       </p:sp>
       <p:sp>
         <p:nvSpPr>
-          <p:cNvPr id="251" name="message - display code messages in  document (default = TRUE)…"/>
+          <p:cNvPr id="253" name="message - display code messages in  document (default = TRUE)…"/>
           <p:cNvSpPr txBox="1"/>
           <p:nvPr/>
         </p:nvSpPr>
@@ -10733,7 +10730,7 @@
       </p:sp>
       <p:sp>
         <p:nvSpPr>
-          <p:cNvPr id="252" name="fig.align - 'left', 'right', or 'center' (default = 'default')…"/>
+          <p:cNvPr id="254" name="fig.align - 'left', 'right', or 'center' (default = 'default')…"/>
           <p:cNvSpPr txBox="1"/>
           <p:nvPr/>
         </p:nvSpPr>
@@ -10871,7 +10868,7 @@
       </p:sp>
       <p:sp>
         <p:nvSpPr>
-          <p:cNvPr id="253" name="Line"/>
+          <p:cNvPr id="255" name="Line"/>
           <p:cNvSpPr/>
           <p:nvPr/>
         </p:nvSpPr>
@@ -10913,7 +10910,7 @@
       </p:sp>
       <p:sp>
         <p:nvSpPr>
-          <p:cNvPr id="254" name="IMPORTANT CHUNK OPTIONS"/>
+          <p:cNvPr id="256" name="IMPORTANT CHUNK OPTIONS"/>
           <p:cNvSpPr txBox="1"/>
           <p:nvPr/>
         </p:nvSpPr>
@@ -10957,14 +10954,14 @@
       </p:sp>
       <p:pic>
         <p:nvPicPr>
-          <p:cNvPr id="255" name="Screen Shot 2016-02-29 at 1.39.23 PM.png" descr="Screen Shot 2016-02-29 at 1.39.23 PM.png"/>
+          <p:cNvPr id="257" name="Screen Shot 2016-02-29 at 1.39.23 PM.png" descr="Screen Shot 2016-02-29 at 1.39.23 PM.png"/>
           <p:cNvPicPr>
             <a:picLocks noChangeAspect="1"/>
           </p:cNvPicPr>
           <p:nvPr/>
         </p:nvPicPr>
         <p:blipFill>
-          <a:blip r:embed="rId25">
+          <a:blip r:embed="rId26">
             <a:extLst/>
           </a:blip>
           <a:stretch>
@@ -10973,7 +10970,7 @@
         </p:blipFill>
         <p:spPr>
           <a:xfrm>
-            <a:off x="12239392" y="7716296"/>
+            <a:off x="12239392" y="7246396"/>
             <a:ext cx="921054" cy="1769739"/>
           </a:xfrm>
           <a:prstGeom prst="rect">
@@ -10989,36 +10986,7 @@
       </p:pic>
       <p:pic>
         <p:nvPicPr>
-          <p:cNvPr id="256" name="shiny-hexbin-sticker-from-rstudio.png" descr="shiny-hexbin-sticker-from-rstudio.png"/>
-          <p:cNvPicPr>
-            <a:picLocks noChangeAspect="1"/>
-          </p:cNvPicPr>
-          <p:nvPr/>
-        </p:nvPicPr>
-        <p:blipFill>
-          <a:blip r:embed="rId26">
-            <a:extLst/>
-          </a:blip>
-          <a:stretch>
-            <a:fillRect/>
-          </a:stretch>
-        </p:blipFill>
-        <p:spPr>
-          <a:xfrm>
-            <a:off x="11587637" y="8974140"/>
-            <a:ext cx="577671" cy="646367"/>
-          </a:xfrm>
-          <a:prstGeom prst="rect">
-            <a:avLst/>
-          </a:prstGeom>
-          <a:ln w="12700">
-            <a:miter lim="400000"/>
-          </a:ln>
-        </p:spPr>
-      </p:pic>
-      <p:pic>
-        <p:nvPicPr>
-          <p:cNvPr id="257" name="Image" descr="Image"/>
+          <p:cNvPr id="258" name="shiny-hexbin-sticker-from-rstudio.png" descr="shiny-hexbin-sticker-from-rstudio.png"/>
           <p:cNvPicPr>
             <a:picLocks noChangeAspect="1"/>
           </p:cNvPicPr>
@@ -11034,37 +11002,8 @@
         </p:blipFill>
         <p:spPr>
           <a:xfrm>
-            <a:off x="238823" y="9978474"/>
-            <a:ext cx="1754521" cy="616478"/>
-          </a:xfrm>
-          <a:prstGeom prst="rect">
-            <a:avLst/>
-          </a:prstGeom>
-          <a:ln w="12700">
-            <a:miter lim="400000"/>
-          </a:ln>
-        </p:spPr>
-      </p:pic>
-      <p:pic>
-        <p:nvPicPr>
-          <p:cNvPr id="258" name="Screen Shot 2014-07-28 at 5.02.25 PM.png" descr="Screen Shot 2014-07-28 at 5.02.25 PM.png"/>
-          <p:cNvPicPr>
-            <a:picLocks noChangeAspect="1"/>
-          </p:cNvPicPr>
-          <p:nvPr/>
-        </p:nvPicPr>
-        <p:blipFill>
-          <a:blip r:embed="rId15">
-            <a:extLst/>
-          </a:blip>
-          <a:stretch>
-            <a:fillRect/>
-          </a:stretch>
-        </p:blipFill>
-        <p:spPr>
-          <a:xfrm>
-            <a:off x="431268" y="4201588"/>
-            <a:ext cx="1231414" cy="961327"/>
+            <a:off x="11587637" y="8504240"/>
+            <a:ext cx="577671" cy="646367"/>
           </a:xfrm>
           <a:prstGeom prst="rect">
             <a:avLst/>
@@ -11092,8 +11031,8 @@
         </p:blipFill>
         <p:spPr>
           <a:xfrm>
-            <a:off x="12174266" y="-22277"/>
-            <a:ext cx="1639861" cy="1867747"/>
+            <a:off x="238823" y="9978474"/>
+            <a:ext cx="1754521" cy="616478"/>
           </a:xfrm>
           <a:prstGeom prst="rect">
             <a:avLst/>
@@ -11105,7 +11044,36 @@
       </p:pic>
       <p:pic>
         <p:nvPicPr>
-          <p:cNvPr id="260" name="Screen Shot 2016-02-29 at 4.53.30 PM.png" descr="Screen Shot 2016-02-29 at 4.53.30 PM.png"/>
+          <p:cNvPr id="260" name="Screen Shot 2014-07-28 at 5.02.25 PM.png" descr="Screen Shot 2014-07-28 at 5.02.25 PM.png"/>
+          <p:cNvPicPr>
+            <a:picLocks noChangeAspect="1"/>
+          </p:cNvPicPr>
+          <p:nvPr/>
+        </p:nvPicPr>
+        <p:blipFill>
+          <a:blip r:embed="rId16">
+            <a:extLst/>
+          </a:blip>
+          <a:stretch>
+            <a:fillRect/>
+          </a:stretch>
+        </p:blipFill>
+        <p:spPr>
+          <a:xfrm>
+            <a:off x="431268" y="4201588"/>
+            <a:ext cx="1231414" cy="961327"/>
+          </a:xfrm>
+          <a:prstGeom prst="rect">
+            <a:avLst/>
+          </a:prstGeom>
+          <a:ln w="12700">
+            <a:miter lim="400000"/>
+          </a:ln>
+        </p:spPr>
+      </p:pic>
+      <p:pic>
+        <p:nvPicPr>
+          <p:cNvPr id="261" name="Image" descr="Image"/>
           <p:cNvPicPr>
             <a:picLocks noChangeAspect="1"/>
           </p:cNvPicPr>
@@ -11121,7 +11089,36 @@
         </p:blipFill>
         <p:spPr>
           <a:xfrm>
-            <a:off x="12358857" y="5297618"/>
+            <a:off x="12174266" y="-22277"/>
+            <a:ext cx="1639861" cy="1867747"/>
+          </a:xfrm>
+          <a:prstGeom prst="rect">
+            <a:avLst/>
+          </a:prstGeom>
+          <a:ln w="12700">
+            <a:miter lim="400000"/>
+          </a:ln>
+        </p:spPr>
+      </p:pic>
+      <p:pic>
+        <p:nvPicPr>
+          <p:cNvPr id="262" name="Screen Shot 2016-02-29 at 4.53.30 PM.png" descr="Screen Shot 2016-02-29 at 4.53.30 PM.png"/>
+          <p:cNvPicPr>
+            <a:picLocks noChangeAspect="1"/>
+          </p:cNvPicPr>
+          <p:nvPr/>
+        </p:nvPicPr>
+        <p:blipFill>
+          <a:blip r:embed="rId30">
+            <a:extLst/>
+          </a:blip>
+          <a:stretch>
+            <a:fillRect/>
+          </a:stretch>
+        </p:blipFill>
+        <p:spPr>
+          <a:xfrm>
+            <a:off x="12358857" y="4891218"/>
             <a:ext cx="1257301" cy="873825"/>
           </a:xfrm>
           <a:prstGeom prst="rect">
@@ -11137,14 +11134,14 @@
       </p:pic>
       <p:pic>
         <p:nvPicPr>
-          <p:cNvPr id="261" name="Screen Shot 2016-02-29 at 3.03.57 PM.png" descr="Screen Shot 2016-02-29 at 3.03.57 PM.png"/>
+          <p:cNvPr id="263" name="Screen Shot 2016-02-29 at 3.03.57 PM.png" descr="Screen Shot 2016-02-29 at 3.03.57 PM.png"/>
           <p:cNvPicPr>
             <a:picLocks noChangeAspect="1"/>
           </p:cNvPicPr>
           <p:nvPr/>
         </p:nvPicPr>
         <p:blipFill>
-          <a:blip r:embed="rId30">
+          <a:blip r:embed="rId31">
             <a:extLst/>
           </a:blip>
           <a:stretch>
@@ -11166,7 +11163,7 @@
       </p:pic>
       <p:grpSp>
         <p:nvGrpSpPr>
-          <p:cNvPr id="284" name="Group"/>
+          <p:cNvPr id="286" name="Group"/>
           <p:cNvGrpSpPr/>
           <p:nvPr/>
         </p:nvGrpSpPr>
@@ -11180,7 +11177,7 @@
         </p:grpSpPr>
         <p:grpSp>
           <p:nvGrpSpPr>
-            <p:cNvPr id="265" name="Group"/>
+            <p:cNvPr id="267" name="Group"/>
             <p:cNvGrpSpPr/>
             <p:nvPr/>
           </p:nvGrpSpPr>
@@ -11188,20 +11185,20 @@
             <a:xfrm>
               <a:off x="63734" y="849605"/>
               <a:ext cx="378731" cy="353385"/>
-              <a:chOff x="148589" y="9433"/>
+              <a:chOff x="0" y="0"/>
               <a:chExt cx="378730" cy="353383"/>
             </a:xfrm>
           </p:grpSpPr>
           <p:pic>
             <p:nvPicPr>
-              <p:cNvPr id="262" name="Screen Shot 2016-02-26 at 1.08.10 PM.png" descr="Screen Shot 2016-02-26 at 1.08.10 PM.png"/>
+              <p:cNvPr id="264" name="Screen Shot 2016-02-26 at 1.08.10 PM.png" descr="Screen Shot 2016-02-26 at 1.08.10 PM.png"/>
               <p:cNvPicPr>
                 <a:picLocks noChangeAspect="1"/>
               </p:cNvPicPr>
               <p:nvPr/>
             </p:nvPicPr>
             <p:blipFill>
-              <a:blip r:embed="rId31">
+              <a:blip r:embed="rId32">
                 <a:extLst/>
               </a:blip>
               <a:srcRect l="9521" t="0" r="0" b="0"/>
@@ -11211,8 +11208,8 @@
             </p:blipFill>
             <p:spPr>
               <a:xfrm>
-                <a:off x="148589" y="9433"/>
-                <a:ext cx="276208" cy="179547"/>
+                <a:off x="0" y="0"/>
+                <a:ext cx="276208" cy="179546"/>
               </a:xfrm>
               <a:prstGeom prst="rect">
                 <a:avLst/>
@@ -11235,14 +11232,14 @@
           </p:pic>
           <p:pic>
             <p:nvPicPr>
-              <p:cNvPr id="263" name="Screen Shot 2016-02-26 at 1.07.00 PM.png" descr="Screen Shot 2016-02-26 at 1.07.00 PM.png"/>
+              <p:cNvPr id="265" name="Screen Shot 2016-02-26 at 1.07.00 PM.png" descr="Screen Shot 2016-02-26 at 1.07.00 PM.png"/>
               <p:cNvPicPr>
                 <a:picLocks noChangeAspect="1"/>
               </p:cNvPicPr>
               <p:nvPr/>
             </p:nvPicPr>
             <p:blipFill>
-              <a:blip r:embed="rId32">
+              <a:blip r:embed="rId33">
                 <a:extLst/>
               </a:blip>
               <a:stretch>
@@ -11251,8 +11248,8 @@
             </p:blipFill>
             <p:spPr>
               <a:xfrm>
-                <a:off x="198783" y="229878"/>
-                <a:ext cx="242984" cy="132940"/>
+                <a:off x="50194" y="220444"/>
+                <a:ext cx="242983" cy="132940"/>
               </a:xfrm>
               <a:prstGeom prst="rect">
                 <a:avLst/>
@@ -11275,14 +11272,14 @@
           </p:pic>
           <p:pic>
             <p:nvPicPr>
-              <p:cNvPr id="264" name="Screen Shot 2016-02-26 at 1.07.33 PM.png" descr="Screen Shot 2016-02-26 at 1.07.33 PM.png"/>
+              <p:cNvPr id="266" name="Screen Shot 2016-02-26 at 1.07.33 PM.png" descr="Screen Shot 2016-02-26 at 1.07.33 PM.png"/>
               <p:cNvPicPr>
                 <a:picLocks noChangeAspect="1"/>
               </p:cNvPicPr>
               <p:nvPr/>
             </p:nvPicPr>
             <p:blipFill>
-              <a:blip r:embed="rId33">
+              <a:blip r:embed="rId34">
                 <a:extLst/>
               </a:blip>
               <a:stretch>
@@ -11291,8 +11288,8 @@
             </p:blipFill>
             <p:spPr>
               <a:xfrm>
-                <a:off x="266123" y="128055"/>
-                <a:ext cx="261197" cy="155631"/>
+                <a:off x="117534" y="118621"/>
+                <a:ext cx="261197" cy="155632"/>
               </a:xfrm>
               <a:prstGeom prst="rect">
                 <a:avLst/>
@@ -11316,7 +11313,7 @@
         </p:grpSp>
         <p:grpSp>
           <p:nvGrpSpPr>
-            <p:cNvPr id="274" name="Group"/>
+            <p:cNvPr id="276" name="Group"/>
             <p:cNvGrpSpPr/>
             <p:nvPr/>
           </p:nvGrpSpPr>
@@ -11324,20 +11321,20 @@
             <a:xfrm>
               <a:off x="64719" y="1395721"/>
               <a:ext cx="376763" cy="406724"/>
-              <a:chOff x="-3281" y="219457"/>
+              <a:chOff x="0" y="0"/>
               <a:chExt cx="376762" cy="406722"/>
             </a:xfrm>
           </p:grpSpPr>
           <p:pic>
             <p:nvPicPr>
-              <p:cNvPr id="266" name="Image" descr="Image"/>
+              <p:cNvPr id="268" name="Image" descr="Image"/>
               <p:cNvPicPr>
                 <a:picLocks noChangeAspect="1"/>
               </p:cNvPicPr>
               <p:nvPr/>
             </p:nvPicPr>
             <p:blipFill>
-              <a:blip r:embed="rId34">
+              <a:blip r:embed="rId35">
                 <a:extLst/>
               </a:blip>
               <a:stretch>
@@ -11346,7 +11343,7 @@
             </p:blipFill>
             <p:spPr>
               <a:xfrm>
-                <a:off x="193736" y="219457"/>
+                <a:off x="197018" y="0"/>
                 <a:ext cx="174229" cy="174229"/>
               </a:xfrm>
               <a:prstGeom prst="rect">
@@ -11361,28 +11358,28 @@
           </p:pic>
           <p:grpSp>
             <p:nvGrpSpPr>
-              <p:cNvPr id="271" name="Group"/>
+              <p:cNvPr id="273" name="Group"/>
               <p:cNvGrpSpPr/>
               <p:nvPr/>
             </p:nvGrpSpPr>
             <p:grpSpPr>
               <a:xfrm>
-                <a:off x="0" y="219457"/>
-                <a:ext cx="180702" cy="174229"/>
+                <a:off x="3281" y="0"/>
+                <a:ext cx="180703" cy="174229"/>
                 <a:chOff x="0" y="0"/>
                 <a:chExt cx="180701" cy="174228"/>
               </a:xfrm>
             </p:grpSpPr>
             <p:pic>
               <p:nvPicPr>
-                <p:cNvPr id="267" name="text-x-tex.png" descr="text-x-tex.png"/>
+                <p:cNvPr id="269" name="text-x-tex.png" descr="text-x-tex.png"/>
                 <p:cNvPicPr>
                   <a:picLocks noChangeAspect="1"/>
                 </p:cNvPicPr>
                 <p:nvPr/>
               </p:nvPicPr>
               <p:blipFill>
-                <a:blip r:embed="rId35">
+                <a:blip r:embed="rId36">
                   <a:extLst/>
                 </a:blip>
                 <a:stretch>
@@ -11406,7 +11403,7 @@
             </p:pic>
             <p:sp>
               <p:nvSpPr>
-                <p:cNvPr id="268" name="Rectangle"/>
+                <p:cNvPr id="270" name="Rectangle"/>
                 <p:cNvSpPr/>
                 <p:nvPr/>
               </p:nvSpPr>
@@ -11475,14 +11472,14 @@
             </p:sp>
             <p:pic>
               <p:nvPicPr>
-                <p:cNvPr id="269" name="Image" descr="Image"/>
+                <p:cNvPr id="271" name="Image" descr="Image"/>
                 <p:cNvPicPr>
                   <a:picLocks noChangeAspect="1"/>
                 </p:cNvPicPr>
                 <p:nvPr/>
               </p:nvPicPr>
               <p:blipFill>
-                <a:blip r:embed="rId36">
+                <a:blip r:embed="rId37">
                   <a:extLst/>
                 </a:blip>
                 <a:srcRect l="0" t="0" r="0" b="0"/>
@@ -11507,14 +11504,14 @@
             </p:pic>
             <p:pic>
               <p:nvPicPr>
-                <p:cNvPr id="270" name="Image" descr="Image"/>
+                <p:cNvPr id="272" name="Image" descr="Image"/>
                 <p:cNvPicPr>
                   <a:picLocks noChangeAspect="1"/>
                 </p:cNvPicPr>
                 <p:nvPr/>
               </p:nvPicPr>
               <p:blipFill>
-                <a:blip r:embed="rId37">
+                <a:blip r:embed="rId38">
                   <a:extLst/>
                 </a:blip>
                 <a:srcRect l="0" t="6115" r="31672" b="68786"/>
@@ -11540,38 +11537,7 @@
           </p:grpSp>
           <p:pic>
             <p:nvPicPr>
-              <p:cNvPr id="272" name="Group" descr="Group"/>
-              <p:cNvPicPr>
-                <a:picLocks noChangeAspect="1"/>
-              </p:cNvPicPr>
-              <p:nvPr/>
-            </p:nvPicPr>
-            <p:blipFill>
-              <a:blip r:embed="rId38">
-                <a:extLst/>
-              </a:blip>
-              <a:stretch>
-                <a:fillRect/>
-              </a:stretch>
-            </p:blipFill>
-            <p:spPr>
-              <a:xfrm>
-                <a:off x="188221" y="433866"/>
-                <a:ext cx="185260" cy="185259"/>
-              </a:xfrm>
-              <a:prstGeom prst="rect">
-                <a:avLst/>
-              </a:prstGeom>
-              <a:ln w="12700" cap="flat">
-                <a:noFill/>
-                <a:miter lim="400000"/>
-              </a:ln>
-              <a:effectLst/>
-            </p:spPr>
-          </p:pic>
-          <p:pic>
-            <p:nvPicPr>
-              <p:cNvPr id="273" name="Group" descr="Group"/>
+              <p:cNvPr id="274" name="Group" descr="Group"/>
               <p:cNvPicPr>
                 <a:picLocks noChangeAspect="1"/>
               </p:cNvPicPr>
@@ -11587,7 +11553,38 @@
             </p:blipFill>
             <p:spPr>
               <a:xfrm>
-                <a:off x="-3282" y="438915"/>
+                <a:off x="191503" y="214408"/>
+                <a:ext cx="185260" cy="185260"/>
+              </a:xfrm>
+              <a:prstGeom prst="rect">
+                <a:avLst/>
+              </a:prstGeom>
+              <a:ln w="12700" cap="flat">
+                <a:noFill/>
+                <a:miter lim="400000"/>
+              </a:ln>
+              <a:effectLst/>
+            </p:spPr>
+          </p:pic>
+          <p:pic>
+            <p:nvPicPr>
+              <p:cNvPr id="275" name="Group" descr="Group"/>
+              <p:cNvPicPr>
+                <a:picLocks noChangeAspect="1"/>
+              </p:cNvPicPr>
+              <p:nvPr/>
+            </p:nvPicPr>
+            <p:blipFill>
+              <a:blip r:embed="rId40">
+                <a:extLst/>
+              </a:blip>
+              <a:stretch>
+                <a:fillRect/>
+              </a:stretch>
+            </p:blipFill>
+            <p:spPr>
+              <a:xfrm>
+                <a:off x="0" y="219457"/>
                 <a:ext cx="187266" cy="187266"/>
               </a:xfrm>
               <a:prstGeom prst="rect">
@@ -11603,14 +11600,14 @@
         </p:grpSp>
         <p:pic>
           <p:nvPicPr>
-            <p:cNvPr id="275" name="rmarkdown-cheatsheet-2.0.001.jpeg" descr="rmarkdown-cheatsheet-2.0.001.jpeg"/>
+            <p:cNvPr id="277" name="rmarkdown-cheatsheet-2.0.001.jpeg" descr="rmarkdown-cheatsheet-2.0.001.jpeg"/>
             <p:cNvPicPr>
               <a:picLocks noChangeAspect="1"/>
             </p:cNvPicPr>
             <p:nvPr/>
           </p:nvPicPr>
           <p:blipFill>
-            <a:blip r:embed="rId40">
+            <a:blip r:embed="rId41">
               <a:extLst/>
             </a:blip>
             <a:srcRect l="1054" t="2482" r="1054" b="64750"/>
@@ -11635,7 +11632,7 @@
         </p:pic>
         <p:grpSp>
           <p:nvGrpSpPr>
-            <p:cNvPr id="279" name="Group"/>
+            <p:cNvPr id="281" name="Group"/>
             <p:cNvGrpSpPr/>
             <p:nvPr/>
           </p:nvGrpSpPr>
@@ -11649,14 +11646,14 @@
           </p:grpSpPr>
           <p:pic>
             <p:nvPicPr>
-              <p:cNvPr id="276" name="RSource.png" descr="RSource.png"/>
+              <p:cNvPr id="278" name="RSource.png" descr="RSource.png"/>
               <p:cNvPicPr>
                 <a:picLocks noChangeAspect="1"/>
               </p:cNvPicPr>
               <p:nvPr/>
             </p:nvPicPr>
             <p:blipFill>
-              <a:blip r:embed="rId41">
+              <a:blip r:embed="rId42">
                 <a:extLst/>
               </a:blip>
               <a:stretch>
@@ -11680,7 +11677,7 @@
           </p:pic>
           <p:sp>
             <p:nvSpPr>
-              <p:cNvPr id="277" name="Circle"/>
+              <p:cNvPr id="279" name="Circle"/>
               <p:cNvSpPr/>
               <p:nvPr/>
             </p:nvSpPr>
@@ -11739,7 +11736,7 @@
           </p:sp>
           <p:sp>
             <p:nvSpPr>
-              <p:cNvPr id="278" name="Rmd"/>
+              <p:cNvPr id="280" name="Rmd"/>
               <p:cNvSpPr txBox="1"/>
               <p:nvPr/>
             </p:nvSpPr>
@@ -11794,7 +11791,7 @@
         </p:grpSp>
         <p:sp>
           <p:nvSpPr>
-            <p:cNvPr id="280" name="Arrow"/>
+            <p:cNvPr id="282" name="Arrow"/>
             <p:cNvSpPr/>
             <p:nvPr/>
           </p:nvSpPr>
@@ -11853,7 +11850,7 @@
         </p:sp>
         <p:sp>
           <p:nvSpPr>
-            <p:cNvPr id="281" name="Arrow"/>
+            <p:cNvPr id="283" name="Arrow"/>
             <p:cNvSpPr/>
             <p:nvPr/>
           </p:nvSpPr>
@@ -11912,7 +11909,7 @@
         </p:sp>
         <p:sp>
           <p:nvSpPr>
-            <p:cNvPr id="282" name="Arrow"/>
+            <p:cNvPr id="284" name="Arrow"/>
             <p:cNvSpPr/>
             <p:nvPr/>
           </p:nvSpPr>
@@ -11971,7 +11968,7 @@
         </p:sp>
         <p:sp>
           <p:nvSpPr>
-            <p:cNvPr id="283" name="Arrow"/>
+            <p:cNvPr id="285" name="Arrow"/>
             <p:cNvSpPr/>
             <p:nvPr/>
           </p:nvSpPr>
@@ -12031,14 +12028,14 @@
       </p:grpSp>
       <p:pic>
         <p:nvPicPr>
-          <p:cNvPr id="285" name="Screen Shot 2016-02-29 at 3.05.17 PM.png" descr="Screen Shot 2016-02-29 at 3.05.17 PM.png"/>
+          <p:cNvPr id="287" name="Screen Shot 2016-02-29 at 3.05.17 PM.png" descr="Screen Shot 2016-02-29 at 3.05.17 PM.png"/>
           <p:cNvPicPr>
             <a:picLocks noChangeAspect="1"/>
           </p:cNvPicPr>
           <p:nvPr/>
         </p:nvPicPr>
         <p:blipFill>
-          <a:blip r:embed="rId42">
+          <a:blip r:embed="rId43">
             <a:extLst/>
           </a:blip>
           <a:srcRect l="24757" t="25000" r="13269" b="10757"/>
@@ -12162,7 +12159,7 @@
       </p:grpSpPr>
       <p:grpSp>
         <p:nvGrpSpPr>
-          <p:cNvPr id="304" name="Group"/>
+          <p:cNvPr id="306" name="Group"/>
           <p:cNvGrpSpPr/>
           <p:nvPr/>
         </p:nvGrpSpPr>
@@ -12176,7 +12173,7 @@
         </p:grpSpPr>
         <p:grpSp>
           <p:nvGrpSpPr>
-            <p:cNvPr id="302" name="Group"/>
+            <p:cNvPr id="304" name="Group"/>
             <p:cNvGrpSpPr/>
             <p:nvPr/>
           </p:nvGrpSpPr>
@@ -12190,7 +12187,7 @@
           </p:grpSpPr>
           <p:sp>
             <p:nvSpPr>
-              <p:cNvPr id="287" name="Triangle"/>
+              <p:cNvPr id="289" name="Triangle"/>
               <p:cNvSpPr/>
               <p:nvPr/>
             </p:nvSpPr>
@@ -12238,7 +12235,7 @@
           </p:sp>
           <p:sp>
             <p:nvSpPr>
-              <p:cNvPr id="288" name="Circle"/>
+              <p:cNvPr id="290" name="Circle"/>
               <p:cNvSpPr/>
               <p:nvPr/>
             </p:nvSpPr>
@@ -12283,7 +12280,7 @@
           </p:sp>
           <p:sp>
             <p:nvSpPr>
-              <p:cNvPr id="289" name="Circle"/>
+              <p:cNvPr id="291" name="Circle"/>
               <p:cNvSpPr/>
               <p:nvPr/>
             </p:nvSpPr>
@@ -12330,7 +12327,7 @@
           </p:sp>
           <p:sp>
             <p:nvSpPr>
-              <p:cNvPr id="290" name="Triangle"/>
+              <p:cNvPr id="292" name="Triangle"/>
               <p:cNvSpPr/>
               <p:nvPr/>
             </p:nvSpPr>
@@ -12378,7 +12375,7 @@
           </p:sp>
           <p:sp>
             <p:nvSpPr>
-              <p:cNvPr id="291" name="Triangle"/>
+              <p:cNvPr id="293" name="Triangle"/>
               <p:cNvSpPr/>
               <p:nvPr/>
             </p:nvSpPr>
@@ -12426,7 +12423,7 @@
           </p:sp>
           <p:sp>
             <p:nvSpPr>
-              <p:cNvPr id="292" name="Circle"/>
+              <p:cNvPr id="294" name="Circle"/>
               <p:cNvSpPr/>
               <p:nvPr/>
             </p:nvSpPr>
@@ -12471,7 +12468,7 @@
           </p:sp>
           <p:sp>
             <p:nvSpPr>
-              <p:cNvPr id="293" name="Circle"/>
+              <p:cNvPr id="295" name="Circle"/>
               <p:cNvSpPr/>
               <p:nvPr/>
             </p:nvSpPr>
@@ -12516,7 +12513,7 @@
           </p:sp>
           <p:sp>
             <p:nvSpPr>
-              <p:cNvPr id="294" name="Triangle"/>
+              <p:cNvPr id="296" name="Triangle"/>
               <p:cNvSpPr/>
               <p:nvPr/>
             </p:nvSpPr>
@@ -12564,7 +12561,7 @@
           </p:sp>
           <p:sp>
             <p:nvSpPr>
-              <p:cNvPr id="295" name="Circle"/>
+              <p:cNvPr id="297" name="Circle"/>
               <p:cNvSpPr/>
               <p:nvPr/>
             </p:nvSpPr>
@@ -12609,7 +12606,7 @@
           </p:sp>
           <p:sp>
             <p:nvSpPr>
-              <p:cNvPr id="296" name="Triangle"/>
+              <p:cNvPr id="298" name="Triangle"/>
               <p:cNvSpPr/>
               <p:nvPr/>
             </p:nvSpPr>
@@ -12657,7 +12654,7 @@
           </p:sp>
           <p:sp>
             <p:nvSpPr>
-              <p:cNvPr id="297" name="Circle"/>
+              <p:cNvPr id="299" name="Circle"/>
               <p:cNvSpPr/>
               <p:nvPr/>
             </p:nvSpPr>
@@ -12702,7 +12699,7 @@
           </p:sp>
           <p:sp>
             <p:nvSpPr>
-              <p:cNvPr id="298" name="Triangle"/>
+              <p:cNvPr id="300" name="Triangle"/>
               <p:cNvSpPr/>
               <p:nvPr/>
             </p:nvSpPr>
@@ -12750,7 +12747,7 @@
           </p:sp>
           <p:sp>
             <p:nvSpPr>
-              <p:cNvPr id="299" name="Circle"/>
+              <p:cNvPr id="301" name="Circle"/>
               <p:cNvSpPr/>
               <p:nvPr/>
             </p:nvSpPr>
@@ -12795,7 +12792,7 @@
           </p:sp>
           <p:sp>
             <p:nvSpPr>
-              <p:cNvPr id="300" name="Triangle"/>
+              <p:cNvPr id="302" name="Triangle"/>
               <p:cNvSpPr/>
               <p:nvPr/>
             </p:nvSpPr>
@@ -12843,7 +12840,7 @@
           </p:sp>
           <p:sp>
             <p:nvSpPr>
-              <p:cNvPr id="301" name="Circle"/>
+              <p:cNvPr id="303" name="Circle"/>
               <p:cNvSpPr/>
               <p:nvPr/>
             </p:nvSpPr>
@@ -12889,7 +12886,7 @@
         </p:grpSp>
         <p:sp>
           <p:nvSpPr>
-            <p:cNvPr id="303" name="Rectangle"/>
+            <p:cNvPr id="305" name="Rectangle"/>
             <p:cNvSpPr/>
             <p:nvPr/>
           </p:nvSpPr>
@@ -12957,7 +12954,7 @@
       </p:grpSp>
       <p:sp>
         <p:nvSpPr>
-          <p:cNvPr id="305" name="```{r results = 'asis'}…"/>
+          <p:cNvPr id="307" name="```{r results = 'asis'}…"/>
           <p:cNvSpPr txBox="1"/>
           <p:nvPr/>
         </p:nvSpPr>
@@ -13313,7 +13310,7 @@
       </p:sp>
       <p:sp>
         <p:nvSpPr>
-          <p:cNvPr id="306" name="Rectangle"/>
+          <p:cNvPr id="308" name="Rectangle"/>
           <p:cNvSpPr/>
           <p:nvPr/>
         </p:nvSpPr>
@@ -13366,7 +13363,7 @@
       </p:sp>
       <p:sp>
         <p:nvSpPr>
-          <p:cNvPr id="307" name="Rectangle"/>
+          <p:cNvPr id="309" name="Rectangle"/>
           <p:cNvSpPr/>
           <p:nvPr/>
         </p:nvSpPr>
@@ -13419,7 +13416,7 @@
       </p:sp>
       <p:sp>
         <p:nvSpPr>
-          <p:cNvPr id="308" name="Rectangle"/>
+          <p:cNvPr id="310" name="Rectangle"/>
           <p:cNvSpPr/>
           <p:nvPr/>
         </p:nvSpPr>
@@ -13472,7 +13469,7 @@
       </p:sp>
       <p:sp>
         <p:nvSpPr>
-          <p:cNvPr id="309" name="Line"/>
+          <p:cNvPr id="311" name="Line"/>
           <p:cNvSpPr/>
           <p:nvPr/>
         </p:nvSpPr>
@@ -13515,7 +13512,7 @@
       </p:sp>
       <p:sp>
         <p:nvSpPr>
-          <p:cNvPr id="310" name="Plain text…"/>
+          <p:cNvPr id="312" name="Plain text…"/>
           <p:cNvSpPr txBox="1"/>
           <p:nvPr/>
         </p:nvSpPr>
@@ -14958,7 +14955,7 @@
       </p:sp>
       <p:sp>
         <p:nvSpPr>
-          <p:cNvPr id="311" name="Write with syntax on the left to create effect on right (after render)"/>
+          <p:cNvPr id="313" name="Write with syntax on the left to create effect on right (after render)"/>
           <p:cNvSpPr txBox="1"/>
           <p:nvPr/>
         </p:nvSpPr>
@@ -15008,7 +15005,7 @@
       </p:sp>
       <p:sp>
         <p:nvSpPr>
-          <p:cNvPr id="312" name="Pandoc’s Markdown"/>
+          <p:cNvPr id="314" name="Pandoc’s Markdown"/>
           <p:cNvSpPr txBox="1"/>
           <p:nvPr/>
         </p:nvSpPr>
@@ -15056,7 +15053,7 @@
       </p:sp>
       <p:sp>
         <p:nvSpPr>
-          <p:cNvPr id="313" name="Line"/>
+          <p:cNvPr id="315" name="Line"/>
           <p:cNvSpPr/>
           <p:nvPr/>
         </p:nvSpPr>
@@ -15097,7 +15094,7 @@
       </p:sp>
       <p:sp>
         <p:nvSpPr>
-          <p:cNvPr id="314" name="Set render options with YAML"/>
+          <p:cNvPr id="316" name="Set render options with YAML"/>
           <p:cNvSpPr txBox="1"/>
           <p:nvPr/>
         </p:nvSpPr>
@@ -15145,7 +15142,7 @@
       </p:sp>
       <p:sp>
         <p:nvSpPr>
-          <p:cNvPr id="315" name="Line"/>
+          <p:cNvPr id="317" name="Line"/>
           <p:cNvSpPr/>
           <p:nvPr/>
         </p:nvSpPr>
@@ -15186,7 +15183,7 @@
       </p:sp>
       <p:sp>
         <p:nvSpPr>
-          <p:cNvPr id="316" name="When you render, R Markdown…"/>
+          <p:cNvPr id="318" name="When you render, R Markdown…"/>
           <p:cNvSpPr txBox="1"/>
           <p:nvPr/>
         </p:nvSpPr>
@@ -15287,7 +15284,7 @@
       </p:sp>
       <p:sp>
         <p:nvSpPr>
-          <p:cNvPr id="317" name="Create a Reusable Template"/>
+          <p:cNvPr id="319" name="Create a Reusable Template"/>
           <p:cNvSpPr txBox="1"/>
           <p:nvPr/>
         </p:nvSpPr>
@@ -15339,7 +15336,7 @@
       </p:sp>
       <p:sp>
         <p:nvSpPr>
-          <p:cNvPr id="318" name="1. Create a new package with a inst/rmarkdown/templates directory…"/>
+          <p:cNvPr id="320" name="1. Create a new package with a inst/rmarkdown/templates directory…"/>
           <p:cNvSpPr txBox="1"/>
           <p:nvPr/>
         </p:nvSpPr>
@@ -15511,7 +15508,7 @@
       </p:sp>
       <p:sp>
         <p:nvSpPr>
-          <p:cNvPr id="319" name="Line"/>
+          <p:cNvPr id="321" name="Line"/>
           <p:cNvSpPr/>
           <p:nvPr/>
         </p:nvSpPr>
@@ -15552,7 +15549,7 @@
       </p:sp>
       <p:sp>
         <p:nvSpPr>
-          <p:cNvPr id="320" name="Line"/>
+          <p:cNvPr id="322" name="Line"/>
           <p:cNvSpPr/>
           <p:nvPr/>
         </p:nvSpPr>
@@ -15595,7 +15592,7 @@
       </p:sp>
       <p:sp>
         <p:nvSpPr>
-          <p:cNvPr id="321" name="Line"/>
+          <p:cNvPr id="323" name="Line"/>
           <p:cNvSpPr/>
           <p:nvPr/>
         </p:nvSpPr>
@@ -15638,7 +15635,7 @@
       </p:sp>
       <p:sp>
         <p:nvSpPr>
-          <p:cNvPr id="322" name="Line"/>
+          <p:cNvPr id="324" name="Line"/>
           <p:cNvSpPr/>
           <p:nvPr/>
         </p:nvSpPr>
@@ -15681,7 +15678,7 @@
       </p:sp>
       <p:sp>
         <p:nvSpPr>
-          <p:cNvPr id="323" name="Set a document’s default output format in the YAML header:"/>
+          <p:cNvPr id="325" name="Set a document’s default output format in the YAML header:"/>
           <p:cNvSpPr txBox="1"/>
           <p:nvPr/>
         </p:nvSpPr>
@@ -15738,7 +15735,7 @@
       </p:sp>
       <p:sp>
         <p:nvSpPr>
-          <p:cNvPr id="324" name="---…"/>
+          <p:cNvPr id="326" name="---…"/>
           <p:cNvSpPr/>
           <p:nvPr/>
         </p:nvSpPr>
@@ -15841,7 +15838,7 @@
       </p:sp>
       <p:graphicFrame>
         <p:nvGraphicFramePr>
-          <p:cNvPr id="325" name="Table"/>
+          <p:cNvPr id="327" name="Table"/>
           <p:cNvGraphicFramePr/>
           <p:nvPr/>
         </p:nvGraphicFramePr>
@@ -17041,7 +17038,7 @@
       </p:graphicFrame>
       <p:sp>
         <p:nvSpPr>
-          <p:cNvPr id="326" name="Line"/>
+          <p:cNvPr id="328" name="Line"/>
           <p:cNvSpPr/>
           <p:nvPr/>
         </p:nvSpPr>
@@ -17084,7 +17081,7 @@
       </p:sp>
       <p:sp>
         <p:nvSpPr>
-          <p:cNvPr id="327" name="Customize output with sub-options (listed to the right):"/>
+          <p:cNvPr id="329" name="Customize output with sub-options (listed to the right):"/>
           <p:cNvSpPr txBox="1"/>
           <p:nvPr/>
         </p:nvSpPr>
@@ -17141,7 +17138,7 @@
       </p:sp>
       <p:sp>
         <p:nvSpPr>
-          <p:cNvPr id="328" name="---…"/>
+          <p:cNvPr id="330" name="---…"/>
           <p:cNvSpPr/>
           <p:nvPr/>
         </p:nvSpPr>
@@ -17280,7 +17277,7 @@
       </p:sp>
       <p:sp>
         <p:nvSpPr>
-          <p:cNvPr id="329" name="Line"/>
+          <p:cNvPr id="331" name="Line"/>
           <p:cNvSpPr/>
           <p:nvPr/>
         </p:nvSpPr>
@@ -17323,7 +17320,7 @@
       </p:sp>
       <p:sp>
         <p:nvSpPr>
-          <p:cNvPr id="330" name="Indent 4 spaces"/>
+          <p:cNvPr id="332" name="Indent 4 spaces"/>
           <p:cNvSpPr/>
           <p:nvPr/>
         </p:nvSpPr>
@@ -17362,10 +17359,10 @@
                   <a:pt x="0" y="1546"/>
                 </a:cubicBezTo>
                 <a:lnTo>
-                  <a:pt x="0" y="15220"/>
+                  <a:pt x="0" y="15242"/>
                 </a:lnTo>
                 <a:cubicBezTo>
-                  <a:pt x="0" y="16072"/>
+                  <a:pt x="0" y="16094"/>
                   <a:pt x="547" y="16766"/>
                   <a:pt x="1220" y="16766"/>
                 </a:cubicBezTo>
@@ -17383,8 +17380,8 @@
                 </a:lnTo>
                 <a:cubicBezTo>
                   <a:pt x="21070" y="16766"/>
-                  <a:pt x="21600" y="16072"/>
-                  <a:pt x="21600" y="15220"/>
+                  <a:pt x="21600" y="16094"/>
+                  <a:pt x="21600" y="15242"/>
                 </a:cubicBezTo>
                 <a:lnTo>
                   <a:pt x="21600" y="1546"/>
@@ -17444,7 +17441,7 @@
       </p:sp>
       <p:sp>
         <p:nvSpPr>
-          <p:cNvPr id="331" name="Indent 2 spaces"/>
+          <p:cNvPr id="333" name="Indent 2 spaces"/>
           <p:cNvSpPr/>
           <p:nvPr/>
         </p:nvSpPr>
@@ -17483,10 +17480,10 @@
                   <a:pt x="0" y="1546"/>
                 </a:cubicBezTo>
                 <a:lnTo>
-                  <a:pt x="0" y="15220"/>
+                  <a:pt x="0" y="15242"/>
                 </a:lnTo>
                 <a:cubicBezTo>
-                  <a:pt x="0" y="16072"/>
+                  <a:pt x="0" y="16094"/>
                   <a:pt x="547" y="16766"/>
                   <a:pt x="1220" y="16766"/>
                 </a:cubicBezTo>
@@ -17504,8 +17501,8 @@
                 </a:lnTo>
                 <a:cubicBezTo>
                   <a:pt x="21070" y="16766"/>
-                  <a:pt x="21600" y="16072"/>
-                  <a:pt x="21600" y="15220"/>
+                  <a:pt x="21600" y="16094"/>
+                  <a:pt x="21600" y="15242"/>
                 </a:cubicBezTo>
                 <a:lnTo>
                   <a:pt x="21600" y="1546"/>
@@ -17565,7 +17562,7 @@
       </p:sp>
       <p:sp>
         <p:nvSpPr>
-          <p:cNvPr id="332" name="html tabsets…"/>
+          <p:cNvPr id="334" name="html tabsets…"/>
           <p:cNvSpPr txBox="1"/>
           <p:nvPr/>
         </p:nvSpPr>
@@ -17645,7 +17642,7 @@
       </p:sp>
       <p:sp>
         <p:nvSpPr>
-          <p:cNvPr id="333" name="# Tabset {.tabset .tabset-fade .tabset-pills}…"/>
+          <p:cNvPr id="335" name="# Tabset {.tabset .tabset-fade .tabset-pills}…"/>
           <p:cNvSpPr/>
           <p:nvPr/>
         </p:nvSpPr>
@@ -17787,7 +17784,7 @@
       </p:sp>
       <p:sp>
         <p:nvSpPr>
-          <p:cNvPr id="334" name="Line"/>
+          <p:cNvPr id="336" name="Line"/>
           <p:cNvSpPr/>
           <p:nvPr/>
         </p:nvSpPr>
@@ -17830,7 +17827,7 @@
       </p:sp>
       <p:sp>
         <p:nvSpPr>
-          <p:cNvPr id="335" name="Tabset…"/>
+          <p:cNvPr id="337" name="Tabset…"/>
           <p:cNvSpPr/>
           <p:nvPr/>
         </p:nvSpPr>
@@ -17963,14 +17960,14 @@
       </p:sp>
       <p:sp>
         <p:nvSpPr>
-          <p:cNvPr id="336" name="Tab 1"/>
+          <p:cNvPr id="338" name="Tab 1"/>
           <p:cNvSpPr/>
           <p:nvPr/>
         </p:nvSpPr>
         <p:spPr>
           <a:xfrm>
             <a:off x="5479936" y="6778714"/>
-            <a:ext cx="436155" cy="248842"/>
+            <a:ext cx="436155" cy="248915"/>
           </a:xfrm>
           <a:custGeom>
             <a:avLst/>
@@ -18075,14 +18072,14 @@
       </p:sp>
       <p:sp>
         <p:nvSpPr>
-          <p:cNvPr id="337" name="Tab 2"/>
+          <p:cNvPr id="339" name="Tab 2"/>
           <p:cNvSpPr/>
           <p:nvPr/>
         </p:nvSpPr>
         <p:spPr>
           <a:xfrm>
             <a:off x="5930786" y="6778714"/>
-            <a:ext cx="436155" cy="248842"/>
+            <a:ext cx="436155" cy="248915"/>
           </a:xfrm>
           <a:custGeom>
             <a:avLst/>
@@ -18187,7 +18184,7 @@
       </p:sp>
       <p:sp>
         <p:nvSpPr>
-          <p:cNvPr id="338" name="---…"/>
+          <p:cNvPr id="340" name="---…"/>
           <p:cNvSpPr/>
           <p:nvPr/>
         </p:nvSpPr>
@@ -18272,7 +18269,7 @@
       </p:sp>
       <p:graphicFrame>
         <p:nvGraphicFramePr>
-          <p:cNvPr id="339" name="Table"/>
+          <p:cNvPr id="341" name="Table"/>
           <p:cNvGraphicFramePr/>
           <p:nvPr/>
         </p:nvGraphicFramePr>
@@ -37828,7 +37825,7 @@
       </p:graphicFrame>
       <p:grpSp>
         <p:nvGrpSpPr>
-          <p:cNvPr id="350" name="Group"/>
+          <p:cNvPr id="352" name="Group"/>
           <p:cNvGrpSpPr/>
           <p:nvPr/>
         </p:nvGrpSpPr>
@@ -37842,7 +37839,7 @@
         </p:grpSpPr>
         <p:sp>
           <p:nvSpPr>
-            <p:cNvPr id="340" name="html"/>
+            <p:cNvPr id="342" name="html"/>
             <p:cNvSpPr txBox="1"/>
             <p:nvPr/>
           </p:nvSpPr>
@@ -37892,7 +37889,7 @@
         </p:sp>
         <p:sp>
           <p:nvSpPr>
-            <p:cNvPr id="341" name="pdf"/>
+            <p:cNvPr id="343" name="pdf"/>
             <p:cNvSpPr txBox="1"/>
             <p:nvPr/>
           </p:nvSpPr>
@@ -37942,7 +37939,7 @@
         </p:sp>
         <p:sp>
           <p:nvSpPr>
-            <p:cNvPr id="342" name="word"/>
+            <p:cNvPr id="344" name="word"/>
             <p:cNvSpPr txBox="1"/>
             <p:nvPr/>
           </p:nvSpPr>
@@ -37992,7 +37989,7 @@
         </p:sp>
         <p:sp>
           <p:nvSpPr>
-            <p:cNvPr id="343" name="odt"/>
+            <p:cNvPr id="345" name="odt"/>
             <p:cNvSpPr txBox="1"/>
             <p:nvPr/>
           </p:nvSpPr>
@@ -38042,7 +38039,7 @@
         </p:sp>
         <p:sp>
           <p:nvSpPr>
-            <p:cNvPr id="344" name="rtf"/>
+            <p:cNvPr id="346" name="rtf"/>
             <p:cNvSpPr txBox="1"/>
             <p:nvPr/>
           </p:nvSpPr>
@@ -38092,7 +38089,7 @@
         </p:sp>
         <p:sp>
           <p:nvSpPr>
-            <p:cNvPr id="345" name="md"/>
+            <p:cNvPr id="347" name="md"/>
             <p:cNvSpPr txBox="1"/>
             <p:nvPr/>
           </p:nvSpPr>
@@ -38142,7 +38139,7 @@
         </p:sp>
         <p:sp>
           <p:nvSpPr>
-            <p:cNvPr id="346" name="ioslides"/>
+            <p:cNvPr id="348" name="ioslides"/>
             <p:cNvSpPr txBox="1"/>
             <p:nvPr/>
           </p:nvSpPr>
@@ -38192,7 +38189,7 @@
         </p:sp>
         <p:sp>
           <p:nvSpPr>
-            <p:cNvPr id="347" name="slidy"/>
+            <p:cNvPr id="349" name="slidy"/>
             <p:cNvSpPr txBox="1"/>
             <p:nvPr/>
           </p:nvSpPr>
@@ -38242,7 +38239,7 @@
         </p:sp>
         <p:sp>
           <p:nvSpPr>
-            <p:cNvPr id="348" name="beamer"/>
+            <p:cNvPr id="350" name="beamer"/>
             <p:cNvSpPr txBox="1"/>
             <p:nvPr/>
           </p:nvSpPr>
@@ -38292,7 +38289,7 @@
         </p:sp>
         <p:sp>
           <p:nvSpPr>
-            <p:cNvPr id="349" name="gituhb"/>
+            <p:cNvPr id="351" name="gituhb"/>
             <p:cNvSpPr txBox="1"/>
             <p:nvPr/>
           </p:nvSpPr>
@@ -38343,7 +38340,7 @@
       </p:grpSp>
       <p:sp>
         <p:nvSpPr>
-          <p:cNvPr id="351" name="Table Suggestions"/>
+          <p:cNvPr id="353" name="Table Suggestions"/>
           <p:cNvSpPr txBox="1"/>
           <p:nvPr/>
         </p:nvSpPr>
@@ -38391,7 +38388,7 @@
       </p:sp>
       <p:sp>
         <p:nvSpPr>
-          <p:cNvPr id="352" name="Citations and Bibliographies"/>
+          <p:cNvPr id="354" name="Citations and Bibliographies"/>
           <p:cNvSpPr txBox="1"/>
           <p:nvPr/>
         </p:nvSpPr>
@@ -38443,7 +38440,7 @@
       </p:sp>
       <p:sp>
         <p:nvSpPr>
-          <p:cNvPr id="353" name="Several functions format R data into tables"/>
+          <p:cNvPr id="355" name="Several functions format R data into tables"/>
           <p:cNvSpPr txBox="1"/>
           <p:nvPr/>
         </p:nvSpPr>
@@ -38493,7 +38490,7 @@
       </p:sp>
       <p:sp>
         <p:nvSpPr>
-          <p:cNvPr id="354" name="Rounded Rectangle"/>
+          <p:cNvPr id="356" name="Rounded Rectangle"/>
           <p:cNvSpPr/>
           <p:nvPr/>
         </p:nvSpPr>
@@ -38537,7 +38534,7 @@
       </p:sp>
       <p:sp>
         <p:nvSpPr>
-          <p:cNvPr id="355" name="Rounded Rectangle"/>
+          <p:cNvPr id="357" name="Rounded Rectangle"/>
           <p:cNvSpPr/>
           <p:nvPr/>
         </p:nvSpPr>
@@ -38581,7 +38578,7 @@
       </p:sp>
       <p:sp>
         <p:nvSpPr>
-          <p:cNvPr id="356" name="Rounded Rectangle"/>
+          <p:cNvPr id="358" name="Rounded Rectangle"/>
           <p:cNvSpPr/>
           <p:nvPr/>
         </p:nvSpPr>
@@ -38625,7 +38622,7 @@
       </p:sp>
       <p:sp>
         <p:nvSpPr>
-          <p:cNvPr id="357" name="Circle"/>
+          <p:cNvPr id="359" name="Circle"/>
           <p:cNvSpPr/>
           <p:nvPr/>
         </p:nvSpPr>
@@ -38666,7 +38663,7 @@
       </p:sp>
       <p:sp>
         <p:nvSpPr>
-          <p:cNvPr id="358" name="Learn more in  the stargazer, xtable, and knitr packages."/>
+          <p:cNvPr id="360" name="Learn more in  the stargazer, xtable, and knitr packages."/>
           <p:cNvSpPr txBox="1"/>
           <p:nvPr/>
         </p:nvSpPr>
@@ -38739,7 +38736,7 @@
       </p:sp>
       <p:sp>
         <p:nvSpPr>
-          <p:cNvPr id="359" name="Line"/>
+          <p:cNvPr id="361" name="Line"/>
           <p:cNvSpPr/>
           <p:nvPr/>
         </p:nvSpPr>
@@ -38782,7 +38779,7 @@
       </p:sp>
       <p:sp>
         <p:nvSpPr>
-          <p:cNvPr id="360" name="Create citations with .bib, .bibtex, .copac, .enl, .json,…"/>
+          <p:cNvPr id="362" name="Create citations with .bib, .bibtex, .copac, .enl, .json,…"/>
           <p:cNvSpPr txBox="1"/>
           <p:nvPr/>
         </p:nvSpPr>
@@ -39080,7 +39077,7 @@
       </p:sp>
       <p:sp>
         <p:nvSpPr>
-          <p:cNvPr id="361" name="Smith cited [@smith04].…"/>
+          <p:cNvPr id="363" name="Smith cited [@smith04].…"/>
           <p:cNvSpPr/>
           <p:nvPr/>
         </p:nvSpPr>
@@ -39159,7 +39156,7 @@
       </p:sp>
       <p:sp>
         <p:nvSpPr>
-          <p:cNvPr id="362" name="Rectangle"/>
+          <p:cNvPr id="364" name="Rectangle"/>
           <p:cNvSpPr/>
           <p:nvPr/>
         </p:nvSpPr>
@@ -39200,7 +39197,7 @@
       </p:sp>
       <p:sp>
         <p:nvSpPr>
-          <p:cNvPr id="363" name="---…"/>
+          <p:cNvPr id="365" name="---…"/>
           <p:cNvSpPr txBox="1"/>
           <p:nvPr/>
         </p:nvSpPr>
@@ -39290,7 +39287,7 @@
       </p:sp>
       <p:pic>
         <p:nvPicPr>
-          <p:cNvPr id="364" name="Screen Shot 2016-03-01 at 3.55.05 PM.png" descr="Screen Shot 2016-03-01 at 3.55.05 PM.png"/>
+          <p:cNvPr id="366" name="Screen Shot 2016-03-01 at 3.55.05 PM.png" descr="Screen Shot 2016-03-01 at 3.55.05 PM.png"/>
           <p:cNvPicPr>
             <a:picLocks noChangeAspect="1"/>
           </p:cNvPicPr>
@@ -39319,7 +39316,7 @@
       </p:pic>
       <p:sp>
         <p:nvSpPr>
-          <p:cNvPr id="365" name="Rectangle"/>
+          <p:cNvPr id="367" name="Rectangle"/>
           <p:cNvSpPr/>
           <p:nvPr/>
         </p:nvSpPr>
@@ -39361,7 +39358,7 @@
       </p:sp>
       <p:sp>
         <p:nvSpPr>
-          <p:cNvPr id="366" name="Arrow"/>
+          <p:cNvPr id="368" name="Arrow"/>
           <p:cNvSpPr/>
           <p:nvPr/>
         </p:nvSpPr>
@@ -39405,7 +39402,7 @@
       </p:sp>
       <p:sp>
         <p:nvSpPr>
-          <p:cNvPr id="367" name="Line"/>
+          <p:cNvPr id="369" name="Line"/>
           <p:cNvSpPr/>
           <p:nvPr/>
         </p:nvSpPr>
@@ -39446,7 +39443,7 @@
       </p:sp>
       <p:sp>
         <p:nvSpPr>
-          <p:cNvPr id="368" name="Line"/>
+          <p:cNvPr id="370" name="Line"/>
           <p:cNvSpPr/>
           <p:nvPr/>
         </p:nvSpPr>
@@ -39487,7 +39484,7 @@
       </p:sp>
       <p:sp>
         <p:nvSpPr>
-          <p:cNvPr id="369" name="Line"/>
+          <p:cNvPr id="371" name="Line"/>
           <p:cNvSpPr/>
           <p:nvPr/>
         </p:nvSpPr>
@@ -39528,7 +39525,7 @@
       </p:sp>
       <p:sp>
         <p:nvSpPr>
-          <p:cNvPr id="370" name="data &lt;- faithful[1:4, ]"/>
+          <p:cNvPr id="372" name="data &lt;- faithful[1:4, ]"/>
           <p:cNvSpPr txBox="1"/>
           <p:nvPr/>
         </p:nvSpPr>
@@ -39583,7 +39580,7 @@
       </p:sp>
       <p:sp>
         <p:nvSpPr>
-          <p:cNvPr id="371" name="RStudio® is a trademark of RStudio, Inc.  •  CC BY SA  RStudio •  info@rstudio.com  •  844-448-1212 • rstudio.com •  Learn more at rmarkdown.rstudio.com  •  rmarkdown  1.6  •  Updated: 2016-02"/>
+          <p:cNvPr id="373" name="RStudio® is a trademark of RStudio, Inc.  •  CC BY SA  RStudio •  info@rstudio.com  •  844-448-1212 • rstudio.com •  Learn more at rmarkdown.rstudio.com  •  rmarkdown  1.6  •  Updated: 2016-02"/>
           <p:cNvSpPr txBox="1"/>
           <p:nvPr/>
         </p:nvSpPr>
@@ -39665,7 +39662,7 @@
       </p:sp>
       <p:pic>
         <p:nvPicPr>
-          <p:cNvPr id="372" name="Screen Shot 2016-03-01 at 3.08.42 PM.png" descr="Screen Shot 2016-03-01 at 3.08.42 PM.png"/>
+          <p:cNvPr id="374" name="Screen Shot 2016-03-01 at 3.08.42 PM.png" descr="Screen Shot 2016-03-01 at 3.08.42 PM.png"/>
           <p:cNvPicPr>
             <a:picLocks noChangeAspect="1"/>
           </p:cNvPicPr>
@@ -39694,7 +39691,7 @@
       </p:pic>
       <p:grpSp>
         <p:nvGrpSpPr>
-          <p:cNvPr id="376" name="Group"/>
+          <p:cNvPr id="378" name="Group"/>
           <p:cNvGrpSpPr/>
           <p:nvPr/>
         </p:nvGrpSpPr>
@@ -39708,7 +39705,7 @@
         </p:grpSpPr>
         <p:pic>
           <p:nvPicPr>
-            <p:cNvPr id="373" name="Screen Shot 2016-03-01 at 2.42.52 PM.png" descr="Screen Shot 2016-03-01 at 2.42.52 PM.png"/>
+            <p:cNvPr id="375" name="Screen Shot 2016-03-01 at 2.42.52 PM.png" descr="Screen Shot 2016-03-01 at 2.42.52 PM.png"/>
             <p:cNvPicPr>
               <a:picLocks noChangeAspect="1"/>
             </p:cNvPicPr>
@@ -39740,7 +39737,7 @@
         </p:pic>
         <p:pic>
           <p:nvPicPr>
-            <p:cNvPr id="374" name="Screen Shot 2016-03-01 at 2.42.52 PM.png" descr="Screen Shot 2016-03-01 at 2.42.52 PM.png"/>
+            <p:cNvPr id="376" name="Screen Shot 2016-03-01 at 2.42.52 PM.png" descr="Screen Shot 2016-03-01 at 2.42.52 PM.png"/>
             <p:cNvPicPr>
               <a:picLocks noChangeAspect="1"/>
             </p:cNvPicPr>
@@ -39772,7 +39769,7 @@
         </p:pic>
         <p:pic>
           <p:nvPicPr>
-            <p:cNvPr id="375" name="Screen Shot 2016-03-01 at 2.42.52 PM.png" descr="Screen Shot 2016-03-01 at 2.42.52 PM.png"/>
+            <p:cNvPr id="377" name="Screen Shot 2016-03-01 at 2.42.52 PM.png" descr="Screen Shot 2016-03-01 at 2.42.52 PM.png"/>
             <p:cNvPicPr>
               <a:picLocks noChangeAspect="1"/>
             </p:cNvPicPr>
@@ -39805,7 +39802,7 @@
       </p:grpSp>
       <p:grpSp>
         <p:nvGrpSpPr>
-          <p:cNvPr id="379" name="Group"/>
+          <p:cNvPr id="381" name="Group"/>
           <p:cNvGrpSpPr/>
           <p:nvPr/>
         </p:nvGrpSpPr>
@@ -39819,7 +39816,7 @@
         </p:grpSpPr>
         <p:pic>
           <p:nvPicPr>
-            <p:cNvPr id="377" name="Screen Shot 2016-03-01 at 2.42.20 PM.png" descr="Screen Shot 2016-03-01 at 2.42.20 PM.png"/>
+            <p:cNvPr id="379" name="Screen Shot 2016-03-01 at 2.42.20 PM.png" descr="Screen Shot 2016-03-01 at 2.42.20 PM.png"/>
             <p:cNvPicPr>
               <a:picLocks noChangeAspect="1"/>
             </p:cNvPicPr>
@@ -39851,7 +39848,7 @@
         </p:pic>
         <p:pic>
           <p:nvPicPr>
-            <p:cNvPr id="378" name="Screen Shot 2016-03-01 at 2.42.20 PM.png" descr="Screen Shot 2016-03-01 at 2.42.20 PM.png"/>
+            <p:cNvPr id="380" name="Screen Shot 2016-03-01 at 2.42.20 PM.png" descr="Screen Shot 2016-03-01 at 2.42.20 PM.png"/>
             <p:cNvPicPr>
               <a:picLocks noChangeAspect="1"/>
             </p:cNvPicPr>
@@ -39884,7 +39881,7 @@
       </p:grpSp>
       <p:pic>
         <p:nvPicPr>
-          <p:cNvPr id="380" name="Screen Shot 2016-03-02 at 9.26.55 AM.png" descr="Screen Shot 2016-03-02 at 9.26.55 AM.png"/>
+          <p:cNvPr id="382" name="Screen Shot 2016-03-02 at 9.26.55 AM.png" descr="Screen Shot 2016-03-02 at 9.26.55 AM.png"/>
           <p:cNvPicPr>
             <a:picLocks noChangeAspect="1"/>
           </p:cNvPicPr>
@@ -39913,7 +39910,7 @@
       </p:pic>
       <p:pic>
         <p:nvPicPr>
-          <p:cNvPr id="381" name="Screen Shot 2016-03-02 at 9.25.27 AM.png" descr="Screen Shot 2016-03-02 at 9.25.27 AM.png"/>
+          <p:cNvPr id="383" name="Screen Shot 2016-03-02 at 9.25.27 AM.png" descr="Screen Shot 2016-03-02 at 9.25.27 AM.png"/>
           <p:cNvPicPr>
             <a:picLocks noChangeAspect="1"/>
           </p:cNvPicPr>
@@ -39942,7 +39939,7 @@
       </p:pic>
       <p:pic>
         <p:nvPicPr>
-          <p:cNvPr id="382" name="Image" descr="Image"/>
+          <p:cNvPr id="384" name="Image" descr="Image"/>
           <p:cNvPicPr>
             <a:picLocks noChangeAspect="1"/>
           </p:cNvPicPr>
@@ -39971,7 +39968,7 @@
       </p:pic>
       <p:pic>
         <p:nvPicPr>
-          <p:cNvPr id="383" name="Image" descr="Image"/>
+          <p:cNvPr id="385" name="Image" descr="Image"/>
           <p:cNvPicPr>
             <a:picLocks noChangeAspect="1"/>
           </p:cNvPicPr>
@@ -40000,7 +39997,7 @@
       </p:pic>
       <p:pic>
         <p:nvPicPr>
-          <p:cNvPr id="384" name="Image" descr="Image"/>
+          <p:cNvPr id="386" name="Image" descr="Image"/>
           <p:cNvPicPr>
             <a:picLocks noChangeAspect="1"/>
           </p:cNvPicPr>
@@ -40029,7 +40026,7 @@
       </p:pic>
       <p:pic>
         <p:nvPicPr>
-          <p:cNvPr id="385" name="Image" descr="Image"/>
+          <p:cNvPr id="387" name="Image" descr="Image"/>
           <p:cNvPicPr>
             <a:picLocks noChangeAspect="1"/>
           </p:cNvPicPr>

</xml_diff>